<commit_message>
inserção da api arduino e organização final das pastas
</commit_message>
<xml_diff>
--- a/APRESENTAÇÃO/Sprint 3/Slides.pptx
+++ b/APRESENTAÇÃO/Sprint 3/Slides.pptx
@@ -6,7 +6,7 @@
     <p:sldMasterId id="2147483696" r:id="rId5"/>
   </p:sldMasterIdLst>
   <p:notesMasterIdLst>
-    <p:notesMasterId r:id="rId22"/>
+    <p:notesMasterId r:id="rId29"/>
   </p:notesMasterIdLst>
   <p:sldIdLst>
     <p:sldId id="256" r:id="rId6"/>
@@ -24,7 +24,14 @@
     <p:sldId id="276" r:id="rId18"/>
     <p:sldId id="277" r:id="rId19"/>
     <p:sldId id="278" r:id="rId20"/>
-    <p:sldId id="279" r:id="rId21"/>
+    <p:sldId id="280" r:id="rId21"/>
+    <p:sldId id="281" r:id="rId22"/>
+    <p:sldId id="282" r:id="rId23"/>
+    <p:sldId id="283" r:id="rId24"/>
+    <p:sldId id="284" r:id="rId25"/>
+    <p:sldId id="285" r:id="rId26"/>
+    <p:sldId id="286" r:id="rId27"/>
+    <p:sldId id="279" r:id="rId28"/>
   </p:sldIdLst>
   <p:sldSz cx="12192000" cy="6858000"/>
   <p:notesSz cx="6858000" cy="9144000"/>
@@ -132,21 +139,56 @@
             <p14:sldId id="257"/>
           </p14:sldIdLst>
         </p14:section>
-        <p14:section name="visão" id="{0AFD315D-421F-4926-A052-213CDB053CC3}">
+        <p14:section name="contexto" id="{0AFD315D-421F-4926-A052-213CDB053CC3}">
           <p14:sldIdLst>
             <p14:sldId id="258"/>
             <p14:sldId id="259"/>
+          </p14:sldIdLst>
+        </p14:section>
+        <p14:section name="problema" id="{0022C630-33D3-4513-8B7A-970623C4C02C}">
+          <p14:sldIdLst>
             <p14:sldId id="261"/>
             <p14:sldId id="272"/>
+          </p14:sldIdLst>
+        </p14:section>
+        <p14:section name="solução" id="{00289869-66E1-4065-AC28-F2562D5C07DA}">
+          <p14:sldIdLst>
             <p14:sldId id="263"/>
             <p14:sldId id="271"/>
+          </p14:sldIdLst>
+        </p14:section>
+        <p14:section name="equipe e planejamento" id="{14A410D0-94A1-4080-B234-56E33A62A2CF}">
+          <p14:sldIdLst>
             <p14:sldId id="273"/>
             <p14:sldId id="274"/>
             <p14:sldId id="275"/>
             <p14:sldId id="262"/>
+          </p14:sldIdLst>
+        </p14:section>
+        <p14:section name="bd" id="{77701305-BB36-4D0F-AC0D-6D9D9AEF884F}">
+          <p14:sldIdLst>
             <p14:sldId id="276"/>
             <p14:sldId id="277"/>
+          </p14:sldIdLst>
+        </p14:section>
+        <p14:section name="site" id="{35B4531F-8DC6-4AA6-82FB-2E793875100F}">
+          <p14:sldIdLst>
             <p14:sldId id="278"/>
+          </p14:sldIdLst>
+        </p14:section>
+        <p14:section name="help desk" id="{1AD7A28D-D6FC-477F-B30F-2B913FEA37A0}">
+          <p14:sldIdLst>
+            <p14:sldId id="280"/>
+            <p14:sldId id="281"/>
+            <p14:sldId id="282"/>
+            <p14:sldId id="283"/>
+            <p14:sldId id="284"/>
+            <p14:sldId id="285"/>
+            <p14:sldId id="286"/>
+          </p14:sldIdLst>
+        </p14:section>
+        <p14:section name="conclusão" id="{DDCA3571-BA8D-49D8-9619-8AAAD2280C6B}">
+          <p14:sldIdLst>
             <p14:sldId id="279"/>
           </p14:sldIdLst>
         </p14:section>
@@ -248,7 +290,7 @@
           </a:lstStyle>
           <a:p>
             <a:fld id="{76B1C3EF-B023-4125-AE71-5BE24305936C}" type="datetimeFigureOut">
-              <a:t>26/05/2022</a:t>
+              <a:t>27/05/2022</a:t>
             </a:fld>
             <a:endParaRPr lang="en-US"/>
           </a:p>
@@ -829,7 +871,7 @@
           <a:p>
             <a:fld id="{F956C699-4089-4636-A474-E7E35B76CA7C}" type="datetimeFigureOut">
               <a:rPr lang="pt-BR" smtClean="0"/>
-              <a:t>26/05/2022</a:t>
+              <a:t>27/05/2022</a:t>
             </a:fld>
             <a:endParaRPr lang="pt-BR"/>
           </a:p>
@@ -1027,7 +1069,7 @@
           <a:p>
             <a:fld id="{F956C699-4089-4636-A474-E7E35B76CA7C}" type="datetimeFigureOut">
               <a:rPr lang="pt-BR" smtClean="0"/>
-              <a:t>26/05/2022</a:t>
+              <a:t>27/05/2022</a:t>
             </a:fld>
             <a:endParaRPr lang="pt-BR"/>
           </a:p>
@@ -1235,7 +1277,7 @@
           <a:p>
             <a:fld id="{F956C699-4089-4636-A474-E7E35B76CA7C}" type="datetimeFigureOut">
               <a:rPr lang="pt-BR" smtClean="0"/>
-              <a:t>26/05/2022</a:t>
+              <a:t>27/05/2022</a:t>
             </a:fld>
             <a:endParaRPr lang="pt-BR"/>
           </a:p>
@@ -1439,7 +1481,7 @@
           <a:p>
             <a:fld id="{2FC3D184-0F2B-4D9D-BDB9-3409F15C70D5}" type="datetimeFigureOut">
               <a:rPr lang="pt-BR" smtClean="0"/>
-              <a:t>26/05/2022</a:t>
+              <a:t>27/05/2022</a:t>
             </a:fld>
             <a:endParaRPr lang="pt-BR" dirty="0"/>
           </a:p>
@@ -1609,7 +1651,7 @@
           <a:p>
             <a:fld id="{2FC3D184-0F2B-4D9D-BDB9-3409F15C70D5}" type="datetimeFigureOut">
               <a:rPr lang="pt-BR" smtClean="0"/>
-              <a:t>26/05/2022</a:t>
+              <a:t>27/05/2022</a:t>
             </a:fld>
             <a:endParaRPr lang="pt-BR" dirty="0"/>
           </a:p>
@@ -1855,7 +1897,7 @@
           <a:p>
             <a:fld id="{2FC3D184-0F2B-4D9D-BDB9-3409F15C70D5}" type="datetimeFigureOut">
               <a:rPr lang="pt-BR" smtClean="0"/>
-              <a:t>26/05/2022</a:t>
+              <a:t>27/05/2022</a:t>
             </a:fld>
             <a:endParaRPr lang="pt-BR" dirty="0"/>
           </a:p>
@@ -2087,7 +2129,7 @@
           <a:p>
             <a:fld id="{2FC3D184-0F2B-4D9D-BDB9-3409F15C70D5}" type="datetimeFigureOut">
               <a:rPr lang="pt-BR" smtClean="0"/>
-              <a:t>26/05/2022</a:t>
+              <a:t>27/05/2022</a:t>
             </a:fld>
             <a:endParaRPr lang="pt-BR" dirty="0"/>
           </a:p>
@@ -2454,7 +2496,7 @@
           <a:p>
             <a:fld id="{2FC3D184-0F2B-4D9D-BDB9-3409F15C70D5}" type="datetimeFigureOut">
               <a:rPr lang="pt-BR" smtClean="0"/>
-              <a:t>26/05/2022</a:t>
+              <a:t>27/05/2022</a:t>
             </a:fld>
             <a:endParaRPr lang="pt-BR" dirty="0"/>
           </a:p>
@@ -2572,7 +2614,7 @@
           <a:p>
             <a:fld id="{2FC3D184-0F2B-4D9D-BDB9-3409F15C70D5}" type="datetimeFigureOut">
               <a:rPr lang="pt-BR" smtClean="0"/>
-              <a:t>26/05/2022</a:t>
+              <a:t>27/05/2022</a:t>
             </a:fld>
             <a:endParaRPr lang="pt-BR" dirty="0"/>
           </a:p>
@@ -2667,7 +2709,7 @@
           <a:p>
             <a:fld id="{2FC3D184-0F2B-4D9D-BDB9-3409F15C70D5}" type="datetimeFigureOut">
               <a:rPr lang="pt-BR" smtClean="0"/>
-              <a:t>26/05/2022</a:t>
+              <a:t>27/05/2022</a:t>
             </a:fld>
             <a:endParaRPr lang="pt-BR" dirty="0"/>
           </a:p>
@@ -2944,7 +2986,7 @@
           <a:p>
             <a:fld id="{2FC3D184-0F2B-4D9D-BDB9-3409F15C70D5}" type="datetimeFigureOut">
               <a:rPr lang="pt-BR" smtClean="0"/>
-              <a:t>26/05/2022</a:t>
+              <a:t>27/05/2022</a:t>
             </a:fld>
             <a:endParaRPr lang="pt-BR" dirty="0"/>
           </a:p>
@@ -3130,7 +3172,7 @@
           <a:p>
             <a:fld id="{F956C699-4089-4636-A474-E7E35B76CA7C}" type="datetimeFigureOut">
               <a:rPr lang="pt-BR" smtClean="0"/>
-              <a:t>26/05/2022</a:t>
+              <a:t>27/05/2022</a:t>
             </a:fld>
             <a:endParaRPr lang="pt-BR"/>
           </a:p>
@@ -3399,7 +3441,7 @@
           <a:p>
             <a:fld id="{2FC3D184-0F2B-4D9D-BDB9-3409F15C70D5}" type="datetimeFigureOut">
               <a:rPr lang="pt-BR" smtClean="0"/>
-              <a:t>26/05/2022</a:t>
+              <a:t>27/05/2022</a:t>
             </a:fld>
             <a:endParaRPr lang="pt-BR" dirty="0"/>
           </a:p>
@@ -3569,7 +3611,7 @@
           <a:p>
             <a:fld id="{2FC3D184-0F2B-4D9D-BDB9-3409F15C70D5}" type="datetimeFigureOut">
               <a:rPr lang="pt-BR" smtClean="0"/>
-              <a:t>26/05/2022</a:t>
+              <a:t>27/05/2022</a:t>
             </a:fld>
             <a:endParaRPr lang="pt-BR" dirty="0"/>
           </a:p>
@@ -3749,7 +3791,7 @@
           <a:p>
             <a:fld id="{2FC3D184-0F2B-4D9D-BDB9-3409F15C70D5}" type="datetimeFigureOut">
               <a:rPr lang="pt-BR" smtClean="0"/>
-              <a:t>26/05/2022</a:t>
+              <a:t>27/05/2022</a:t>
             </a:fld>
             <a:endParaRPr lang="pt-BR" dirty="0"/>
           </a:p>
@@ -4012,7 +4054,7 @@
           <a:p>
             <a:fld id="{F956C699-4089-4636-A474-E7E35B76CA7C}" type="datetimeFigureOut">
               <a:rPr lang="pt-BR" smtClean="0"/>
-              <a:t>26/05/2022</a:t>
+              <a:t>27/05/2022</a:t>
             </a:fld>
             <a:endParaRPr lang="pt-BR"/>
           </a:p>
@@ -4277,7 +4319,7 @@
           <a:p>
             <a:fld id="{F956C699-4089-4636-A474-E7E35B76CA7C}" type="datetimeFigureOut">
               <a:rPr lang="pt-BR" smtClean="0"/>
-              <a:t>26/05/2022</a:t>
+              <a:t>27/05/2022</a:t>
             </a:fld>
             <a:endParaRPr lang="pt-BR"/>
           </a:p>
@@ -4689,7 +4731,7 @@
           <a:p>
             <a:fld id="{F956C699-4089-4636-A474-E7E35B76CA7C}" type="datetimeFigureOut">
               <a:rPr lang="pt-BR" smtClean="0"/>
-              <a:t>26/05/2022</a:t>
+              <a:t>27/05/2022</a:t>
             </a:fld>
             <a:endParaRPr lang="pt-BR"/>
           </a:p>
@@ -4830,7 +4872,7 @@
           <a:p>
             <a:fld id="{F956C699-4089-4636-A474-E7E35B76CA7C}" type="datetimeFigureOut">
               <a:rPr lang="pt-BR" smtClean="0"/>
-              <a:t>26/05/2022</a:t>
+              <a:t>27/05/2022</a:t>
             </a:fld>
             <a:endParaRPr lang="pt-BR"/>
           </a:p>
@@ -4943,7 +4985,7 @@
           <a:p>
             <a:fld id="{F956C699-4089-4636-A474-E7E35B76CA7C}" type="datetimeFigureOut">
               <a:rPr lang="pt-BR" smtClean="0"/>
-              <a:t>26/05/2022</a:t>
+              <a:t>27/05/2022</a:t>
             </a:fld>
             <a:endParaRPr lang="pt-BR"/>
           </a:p>
@@ -5254,7 +5296,7 @@
           <a:p>
             <a:fld id="{F956C699-4089-4636-A474-E7E35B76CA7C}" type="datetimeFigureOut">
               <a:rPr lang="pt-BR" smtClean="0"/>
-              <a:t>26/05/2022</a:t>
+              <a:t>27/05/2022</a:t>
             </a:fld>
             <a:endParaRPr lang="pt-BR"/>
           </a:p>
@@ -5542,7 +5584,7 @@
           <a:p>
             <a:fld id="{F956C699-4089-4636-A474-E7E35B76CA7C}" type="datetimeFigureOut">
               <a:rPr lang="pt-BR" smtClean="0"/>
-              <a:t>26/05/2022</a:t>
+              <a:t>27/05/2022</a:t>
             </a:fld>
             <a:endParaRPr lang="pt-BR"/>
           </a:p>
@@ -5783,7 +5825,7 @@
           <a:p>
             <a:fld id="{F956C699-4089-4636-A474-E7E35B76CA7C}" type="datetimeFigureOut">
               <a:rPr lang="pt-BR" smtClean="0"/>
-              <a:t>26/05/2022</a:t>
+              <a:t>27/05/2022</a:t>
             </a:fld>
             <a:endParaRPr lang="pt-BR"/>
           </a:p>
@@ -6335,7 +6377,7 @@
           <a:p>
             <a:fld id="{2FC3D184-0F2B-4D9D-BDB9-3409F15C70D5}" type="datetimeFigureOut">
               <a:rPr lang="pt-BR" smtClean="0"/>
-              <a:t>26/05/2022</a:t>
+              <a:t>27/05/2022</a:t>
             </a:fld>
             <a:endParaRPr lang="pt-BR" dirty="0"/>
           </a:p>
@@ -12405,6 +12447,2325 @@
 </file>
 
 <file path=ppt/slides/slide16.xml><?xml version="1.0" encoding="utf-8"?>
+<p:sld xmlns:a="http://schemas.openxmlformats.org/drawingml/2006/main" xmlns:r="http://schemas.openxmlformats.org/officeDocument/2006/relationships" xmlns:p="http://schemas.openxmlformats.org/presentationml/2006/main">
+  <p:cSld>
+    <p:spTree>
+      <p:nvGrpSpPr>
+        <p:cNvPr id="1" name=""/>
+        <p:cNvGrpSpPr/>
+        <p:nvPr/>
+      </p:nvGrpSpPr>
+      <p:grpSpPr>
+        <a:xfrm>
+          <a:off x="0" y="0"/>
+          <a:ext cx="0" cy="0"/>
+          <a:chOff x="0" y="0"/>
+          <a:chExt cx="0" cy="0"/>
+        </a:xfrm>
+      </p:grpSpPr>
+      <p:sp>
+        <p:nvSpPr>
+          <p:cNvPr id="8" name="background">
+            <a:extLst>
+              <a:ext uri="{FF2B5EF4-FFF2-40B4-BE49-F238E27FC236}">
+                <a16:creationId xmlns:a16="http://schemas.microsoft.com/office/drawing/2014/main" id="{DCCF3051-B302-168D-0BA2-FC72EB2D22F0}"/>
+              </a:ext>
+            </a:extLst>
+          </p:cNvPr>
+          <p:cNvSpPr>
+            <a:spLocks noGrp="1" noRot="1" noMove="1" noResize="1" noEditPoints="1" noAdjustHandles="1" noChangeArrowheads="1" noChangeShapeType="1"/>
+          </p:cNvSpPr>
+          <p:nvPr/>
+        </p:nvSpPr>
+        <p:spPr>
+          <a:xfrm>
+            <a:off x="1" y="0"/>
+            <a:ext cx="12192000" cy="6858000"/>
+          </a:xfrm>
+          <a:prstGeom prst="rect">
+            <a:avLst/>
+          </a:prstGeom>
+          <a:solidFill>
+            <a:srgbClr val="FDFBFF"/>
+          </a:solidFill>
+        </p:spPr>
+        <p:style>
+          <a:lnRef idx="2">
+            <a:schemeClr val="accent1">
+              <a:shade val="50000"/>
+            </a:schemeClr>
+          </a:lnRef>
+          <a:fillRef idx="1">
+            <a:schemeClr val="accent1"/>
+          </a:fillRef>
+          <a:effectRef idx="0">
+            <a:schemeClr val="accent1"/>
+          </a:effectRef>
+          <a:fontRef idx="minor">
+            <a:schemeClr val="lt1"/>
+          </a:fontRef>
+        </p:style>
+        <p:txBody>
+          <a:bodyPr rtlCol="0" anchor="ctr"/>
+          <a:lstStyle/>
+          <a:p>
+            <a:pPr algn="ctr"/>
+            <a:endParaRPr lang="pt-BR" sz="1355" dirty="0">
+              <a:latin typeface="Quicksand" panose="00000500000000000000" pitchFamily="2" charset="0"/>
+            </a:endParaRPr>
+          </a:p>
+        </p:txBody>
+      </p:sp>
+      <p:pic>
+        <p:nvPicPr>
+          <p:cNvPr id="2" name="!!img">
+            <a:extLst>
+              <a:ext uri="{FF2B5EF4-FFF2-40B4-BE49-F238E27FC236}">
+                <a16:creationId xmlns:a16="http://schemas.microsoft.com/office/drawing/2014/main" id="{A33F307D-F78F-BDD5-497C-975864903A9B}"/>
+              </a:ext>
+            </a:extLst>
+          </p:cNvPr>
+          <p:cNvPicPr>
+            <a:picLocks noChangeAspect="1"/>
+          </p:cNvPicPr>
+          <p:nvPr/>
+        </p:nvPicPr>
+        <p:blipFill>
+          <a:blip r:embed="rId2">
+            <a:alphaModFix amt="20000"/>
+            <a:extLst>
+              <a:ext uri="{28A0092B-C50C-407E-A947-70E740481C1C}">
+                <a14:useLocalDpi xmlns:a14="http://schemas.microsoft.com/office/drawing/2010/main" val="0"/>
+              </a:ext>
+            </a:extLst>
+          </a:blip>
+          <a:srcRect/>
+          <a:stretch/>
+        </p:blipFill>
+        <p:spPr>
+          <a:xfrm rot="21329866">
+            <a:off x="-3032327" y="3934899"/>
+            <a:ext cx="7302127" cy="6980654"/>
+          </a:xfrm>
+          <a:prstGeom prst="rect">
+            <a:avLst/>
+          </a:prstGeom>
+        </p:spPr>
+      </p:pic>
+      <p:sp>
+        <p:nvSpPr>
+          <p:cNvPr id="3" name="CaixaDeTexto 2">
+            <a:extLst>
+              <a:ext uri="{FF2B5EF4-FFF2-40B4-BE49-F238E27FC236}">
+                <a16:creationId xmlns:a16="http://schemas.microsoft.com/office/drawing/2014/main" id="{9AD6761C-3940-A0D4-EC76-C88650B410E4}"/>
+              </a:ext>
+            </a:extLst>
+          </p:cNvPr>
+          <p:cNvSpPr txBox="1"/>
+          <p:nvPr/>
+        </p:nvSpPr>
+        <p:spPr>
+          <a:xfrm>
+            <a:off x="7154844" y="6048609"/>
+            <a:ext cx="7759004" cy="769441"/>
+          </a:xfrm>
+          <a:prstGeom prst="rect">
+            <a:avLst/>
+          </a:prstGeom>
+          <a:noFill/>
+          <a:ln>
+            <a:noFill/>
+          </a:ln>
+        </p:spPr>
+        <p:txBody>
+          <a:bodyPr wrap="square" rtlCol="0">
+            <a:spAutoFit/>
+          </a:bodyPr>
+          <a:lstStyle/>
+          <a:p>
+            <a:pPr algn="ctr"/>
+            <a:r>
+              <a:rPr lang="pt-BR" sz="4400" dirty="0">
+                <a:ln>
+                  <a:solidFill>
+                    <a:srgbClr val="8403E8"/>
+                  </a:solidFill>
+                </a:ln>
+                <a:noFill/>
+                <a:latin typeface="Raleway" panose="020B0604020202020204" pitchFamily="2" charset="0"/>
+                <a:cs typeface="Quire Sans" panose="020B0502040204020203" pitchFamily="34" charset="0"/>
+              </a:rPr>
+              <a:t>TÊXTIL</a:t>
+            </a:r>
+          </a:p>
+        </p:txBody>
+      </p:sp>
+      <p:sp>
+        <p:nvSpPr>
+          <p:cNvPr id="4" name="CaixaDeTexto 3">
+            <a:extLst>
+              <a:ext uri="{FF2B5EF4-FFF2-40B4-BE49-F238E27FC236}">
+                <a16:creationId xmlns:a16="http://schemas.microsoft.com/office/drawing/2014/main" id="{E0ADF1A4-23F5-587C-A62C-C741B92B8F2E}"/>
+              </a:ext>
+            </a:extLst>
+          </p:cNvPr>
+          <p:cNvSpPr txBox="1"/>
+          <p:nvPr/>
+        </p:nvSpPr>
+        <p:spPr>
+          <a:xfrm>
+            <a:off x="-677011" y="105864"/>
+            <a:ext cx="3328272" cy="769441"/>
+          </a:xfrm>
+          <a:prstGeom prst="rect">
+            <a:avLst/>
+          </a:prstGeom>
+          <a:noFill/>
+          <a:ln>
+            <a:noFill/>
+          </a:ln>
+        </p:spPr>
+        <p:txBody>
+          <a:bodyPr wrap="square" lIns="91440" tIns="45720" rIns="91440" bIns="45720" rtlCol="0" anchor="t">
+            <a:spAutoFit/>
+          </a:bodyPr>
+          <a:lstStyle/>
+          <a:p>
+            <a:pPr algn="ctr"/>
+            <a:r>
+              <a:rPr lang="pt-BR" sz="4400" dirty="0">
+                <a:solidFill>
+                  <a:srgbClr val="8403E8"/>
+                </a:solidFill>
+                <a:latin typeface="Raleway"/>
+                <a:cs typeface="Quire Sans"/>
+              </a:rPr>
+              <a:t>OMNI</a:t>
+            </a:r>
+          </a:p>
+        </p:txBody>
+      </p:sp>
+      <p:sp>
+        <p:nvSpPr>
+          <p:cNvPr id="14" name="CaixaDeTexto 13">
+            <a:extLst>
+              <a:ext uri="{FF2B5EF4-FFF2-40B4-BE49-F238E27FC236}">
+                <a16:creationId xmlns:a16="http://schemas.microsoft.com/office/drawing/2014/main" id="{54E7C22C-4DAF-6449-6BB2-7DA4AF46C6B4}"/>
+              </a:ext>
+            </a:extLst>
+          </p:cNvPr>
+          <p:cNvSpPr txBox="1"/>
+          <p:nvPr/>
+        </p:nvSpPr>
+        <p:spPr>
+          <a:xfrm>
+            <a:off x="3386560" y="2874238"/>
+            <a:ext cx="5415194" cy="1569660"/>
+          </a:xfrm>
+          <a:prstGeom prst="rect">
+            <a:avLst/>
+          </a:prstGeom>
+          <a:noFill/>
+          <a:ln>
+            <a:noFill/>
+          </a:ln>
+        </p:spPr>
+        <p:txBody>
+          <a:bodyPr wrap="square" lIns="91440" tIns="45720" rIns="91440" bIns="45720" rtlCol="0" anchor="t">
+            <a:spAutoFit/>
+          </a:bodyPr>
+          <a:lstStyle/>
+          <a:p>
+            <a:pPr algn="ctr"/>
+            <a:r>
+              <a:rPr lang="pt-BR" sz="4800" dirty="0">
+                <a:latin typeface="Raleway" pitchFamily="2" charset="0"/>
+              </a:rPr>
+              <a:t>Ferramenta de </a:t>
+            </a:r>
+            <a:r>
+              <a:rPr lang="pt-BR" sz="4800" dirty="0">
+                <a:solidFill>
+                  <a:srgbClr val="8403E8"/>
+                </a:solidFill>
+                <a:latin typeface="Raleway" pitchFamily="2" charset="0"/>
+              </a:rPr>
+              <a:t>Help Desk</a:t>
+            </a:r>
+          </a:p>
+        </p:txBody>
+      </p:sp>
+      <p:sp>
+        <p:nvSpPr>
+          <p:cNvPr id="9" name="TextBox 11">
+            <a:extLst>
+              <a:ext uri="{FF2B5EF4-FFF2-40B4-BE49-F238E27FC236}">
+                <a16:creationId xmlns:a16="http://schemas.microsoft.com/office/drawing/2014/main" id="{885A8FC7-3B65-D380-0FEA-DA33D6BF3F02}"/>
+              </a:ext>
+            </a:extLst>
+          </p:cNvPr>
+          <p:cNvSpPr txBox="1"/>
+          <p:nvPr/>
+        </p:nvSpPr>
+        <p:spPr>
+          <a:xfrm>
+            <a:off x="9336893" y="-601014"/>
+            <a:ext cx="2747266" cy="461665"/>
+          </a:xfrm>
+          <a:prstGeom prst="rect">
+            <a:avLst/>
+          </a:prstGeom>
+          <a:noFill/>
+        </p:spPr>
+        <p:txBody>
+          <a:bodyPr rot="0" spcFirstLastPara="0" vertOverflow="overflow" horzOverflow="overflow" vert="horz" wrap="square" lIns="91440" tIns="45720" rIns="91440" bIns="45720" numCol="1" spcCol="0" rtlCol="0" fromWordArt="0" anchor="t" anchorCtr="0" forceAA="0" compatLnSpc="1">
+            <a:prstTxWarp prst="textNoShape">
+              <a:avLst/>
+            </a:prstTxWarp>
+            <a:spAutoFit/>
+          </a:bodyPr>
+          <a:lstStyle/>
+          <a:p>
+            <a:pPr algn="l"/>
+            <a:r>
+              <a:rPr lang="en-US" sz="2400" dirty="0" err="1">
+                <a:solidFill>
+                  <a:srgbClr val="7030A0"/>
+                </a:solidFill>
+                <a:latin typeface="Raleway" pitchFamily="2" charset="0"/>
+                <a:cs typeface="Calibri"/>
+              </a:rPr>
+              <a:t>desenvolvimento</a:t>
+            </a:r>
+            <a:endParaRPr lang="en-US" sz="2400" dirty="0">
+              <a:solidFill>
+                <a:srgbClr val="7030A0"/>
+              </a:solidFill>
+              <a:latin typeface="Raleway" pitchFamily="2" charset="0"/>
+              <a:cs typeface="Calibri"/>
+            </a:endParaRPr>
+          </a:p>
+        </p:txBody>
+      </p:sp>
+      <p:sp>
+        <p:nvSpPr>
+          <p:cNvPr id="10" name="Elipse 9">
+            <a:extLst>
+              <a:ext uri="{FF2B5EF4-FFF2-40B4-BE49-F238E27FC236}">
+                <a16:creationId xmlns:a16="http://schemas.microsoft.com/office/drawing/2014/main" id="{54C59E0B-9841-C2C1-E264-279317C2B7C7}"/>
+              </a:ext>
+            </a:extLst>
+          </p:cNvPr>
+          <p:cNvSpPr/>
+          <p:nvPr/>
+        </p:nvSpPr>
+        <p:spPr>
+          <a:xfrm>
+            <a:off x="8742302" y="-627911"/>
+            <a:ext cx="515461" cy="515461"/>
+          </a:xfrm>
+          <a:prstGeom prst="ellipse">
+            <a:avLst/>
+          </a:prstGeom>
+          <a:solidFill>
+            <a:srgbClr val="8403E8"/>
+          </a:solidFill>
+          <a:ln>
+            <a:noFill/>
+          </a:ln>
+        </p:spPr>
+        <p:style>
+          <a:lnRef idx="2">
+            <a:schemeClr val="accent1">
+              <a:shade val="50000"/>
+            </a:schemeClr>
+          </a:lnRef>
+          <a:fillRef idx="1">
+            <a:schemeClr val="accent1"/>
+          </a:fillRef>
+          <a:effectRef idx="0">
+            <a:schemeClr val="accent1"/>
+          </a:effectRef>
+          <a:fontRef idx="minor">
+            <a:schemeClr val="lt1"/>
+          </a:fontRef>
+        </p:style>
+        <p:txBody>
+          <a:bodyPr rtlCol="0" anchor="ctr"/>
+          <a:lstStyle/>
+          <a:p>
+            <a:pPr algn="ctr"/>
+            <a:endParaRPr lang="pt-BR"/>
+          </a:p>
+        </p:txBody>
+      </p:sp>
+    </p:spTree>
+    <p:extLst>
+      <p:ext uri="{BB962C8B-B14F-4D97-AF65-F5344CB8AC3E}">
+        <p14:creationId xmlns:p14="http://schemas.microsoft.com/office/powerpoint/2010/main" val="431354776"/>
+      </p:ext>
+    </p:extLst>
+  </p:cSld>
+  <p:clrMapOvr>
+    <a:masterClrMapping/>
+  </p:clrMapOvr>
+  <mc:AlternateContent xmlns:mc="http://schemas.openxmlformats.org/markup-compatibility/2006" xmlns:p159="http://schemas.microsoft.com/office/powerpoint/2015/09/main">
+    <mc:Choice Requires="p159">
+      <p:transition xmlns:p14="http://schemas.microsoft.com/office/powerpoint/2010/main" spd="slow" p14:dur="2000">
+        <p159:morph option="byObject"/>
+      </p:transition>
+    </mc:Choice>
+    <mc:Fallback xmlns="">
+      <p:transition spd="slow">
+        <p:fade/>
+      </p:transition>
+    </mc:Fallback>
+  </mc:AlternateContent>
+</p:sld>
+</file>
+
+<file path=ppt/slides/slide17.xml><?xml version="1.0" encoding="utf-8"?>
+<p:sld xmlns:a="http://schemas.openxmlformats.org/drawingml/2006/main" xmlns:r="http://schemas.openxmlformats.org/officeDocument/2006/relationships" xmlns:p="http://schemas.openxmlformats.org/presentationml/2006/main">
+  <p:cSld>
+    <p:spTree>
+      <p:nvGrpSpPr>
+        <p:cNvPr id="1" name=""/>
+        <p:cNvGrpSpPr/>
+        <p:nvPr/>
+      </p:nvGrpSpPr>
+      <p:grpSpPr>
+        <a:xfrm>
+          <a:off x="0" y="0"/>
+          <a:ext cx="0" cy="0"/>
+          <a:chOff x="0" y="0"/>
+          <a:chExt cx="0" cy="0"/>
+        </a:xfrm>
+      </p:grpSpPr>
+      <p:sp>
+        <p:nvSpPr>
+          <p:cNvPr id="9" name="TextBox 11">
+            <a:extLst>
+              <a:ext uri="{FF2B5EF4-FFF2-40B4-BE49-F238E27FC236}">
+                <a16:creationId xmlns:a16="http://schemas.microsoft.com/office/drawing/2014/main" id="{885A8FC7-3B65-D380-0FEA-DA33D6BF3F02}"/>
+              </a:ext>
+            </a:extLst>
+          </p:cNvPr>
+          <p:cNvSpPr txBox="1"/>
+          <p:nvPr/>
+        </p:nvSpPr>
+        <p:spPr>
+          <a:xfrm>
+            <a:off x="9336893" y="-601014"/>
+            <a:ext cx="2747266" cy="461665"/>
+          </a:xfrm>
+          <a:prstGeom prst="rect">
+            <a:avLst/>
+          </a:prstGeom>
+          <a:noFill/>
+        </p:spPr>
+        <p:txBody>
+          <a:bodyPr rot="0" spcFirstLastPara="0" vertOverflow="overflow" horzOverflow="overflow" vert="horz" wrap="square" lIns="91440" tIns="45720" rIns="91440" bIns="45720" numCol="1" spcCol="0" rtlCol="0" fromWordArt="0" anchor="t" anchorCtr="0" forceAA="0" compatLnSpc="1">
+            <a:prstTxWarp prst="textNoShape">
+              <a:avLst/>
+            </a:prstTxWarp>
+            <a:spAutoFit/>
+          </a:bodyPr>
+          <a:lstStyle/>
+          <a:p>
+            <a:pPr algn="l"/>
+            <a:r>
+              <a:rPr lang="en-US" sz="2400" dirty="0" err="1">
+                <a:solidFill>
+                  <a:srgbClr val="7030A0"/>
+                </a:solidFill>
+                <a:latin typeface="Raleway" pitchFamily="2" charset="0"/>
+                <a:cs typeface="Calibri"/>
+              </a:rPr>
+              <a:t>desenvolvimento</a:t>
+            </a:r>
+            <a:endParaRPr lang="en-US" sz="2400" dirty="0">
+              <a:solidFill>
+                <a:srgbClr val="7030A0"/>
+              </a:solidFill>
+              <a:latin typeface="Raleway" pitchFamily="2" charset="0"/>
+              <a:cs typeface="Calibri"/>
+            </a:endParaRPr>
+          </a:p>
+        </p:txBody>
+      </p:sp>
+      <p:sp>
+        <p:nvSpPr>
+          <p:cNvPr id="10" name="Elipse 9">
+            <a:extLst>
+              <a:ext uri="{FF2B5EF4-FFF2-40B4-BE49-F238E27FC236}">
+                <a16:creationId xmlns:a16="http://schemas.microsoft.com/office/drawing/2014/main" id="{54C59E0B-9841-C2C1-E264-279317C2B7C7}"/>
+              </a:ext>
+            </a:extLst>
+          </p:cNvPr>
+          <p:cNvSpPr/>
+          <p:nvPr/>
+        </p:nvSpPr>
+        <p:spPr>
+          <a:xfrm>
+            <a:off x="8742302" y="-627911"/>
+            <a:ext cx="515461" cy="515461"/>
+          </a:xfrm>
+          <a:prstGeom prst="ellipse">
+            <a:avLst/>
+          </a:prstGeom>
+          <a:solidFill>
+            <a:srgbClr val="8403E8"/>
+          </a:solidFill>
+          <a:ln>
+            <a:noFill/>
+          </a:ln>
+        </p:spPr>
+        <p:style>
+          <a:lnRef idx="2">
+            <a:schemeClr val="accent1">
+              <a:shade val="50000"/>
+            </a:schemeClr>
+          </a:lnRef>
+          <a:fillRef idx="1">
+            <a:schemeClr val="accent1"/>
+          </a:fillRef>
+          <a:effectRef idx="0">
+            <a:schemeClr val="accent1"/>
+          </a:effectRef>
+          <a:fontRef idx="minor">
+            <a:schemeClr val="lt1"/>
+          </a:fontRef>
+        </p:style>
+        <p:txBody>
+          <a:bodyPr rtlCol="0" anchor="ctr"/>
+          <a:lstStyle/>
+          <a:p>
+            <a:pPr algn="ctr"/>
+            <a:endParaRPr lang="pt-BR"/>
+          </a:p>
+        </p:txBody>
+      </p:sp>
+      <p:pic>
+        <p:nvPicPr>
+          <p:cNvPr id="22" name="Imagem 21">
+            <a:extLst>
+              <a:ext uri="{FF2B5EF4-FFF2-40B4-BE49-F238E27FC236}">
+                <a16:creationId xmlns:a16="http://schemas.microsoft.com/office/drawing/2014/main" id="{2967E298-6994-1835-F34C-4CFBF95FF3EE}"/>
+              </a:ext>
+            </a:extLst>
+          </p:cNvPr>
+          <p:cNvPicPr>
+            <a:picLocks noChangeAspect="1"/>
+          </p:cNvPicPr>
+          <p:nvPr/>
+        </p:nvPicPr>
+        <p:blipFill>
+          <a:blip r:embed="rId2"/>
+          <a:stretch>
+            <a:fillRect/>
+          </a:stretch>
+        </p:blipFill>
+        <p:spPr>
+          <a:xfrm>
+            <a:off x="0" y="-32081"/>
+            <a:ext cx="12192000" cy="6922162"/>
+          </a:xfrm>
+          <a:prstGeom prst="rect">
+            <a:avLst/>
+          </a:prstGeom>
+        </p:spPr>
+      </p:pic>
+    </p:spTree>
+    <p:extLst>
+      <p:ext uri="{BB962C8B-B14F-4D97-AF65-F5344CB8AC3E}">
+        <p14:creationId xmlns:p14="http://schemas.microsoft.com/office/powerpoint/2010/main" val="729795635"/>
+      </p:ext>
+    </p:extLst>
+  </p:cSld>
+  <p:clrMapOvr>
+    <a:masterClrMapping/>
+  </p:clrMapOvr>
+  <mc:AlternateContent xmlns:mc="http://schemas.openxmlformats.org/markup-compatibility/2006">
+    <mc:Choice xmlns:p159="http://schemas.microsoft.com/office/powerpoint/2015/09/main" Requires="p159">
+      <p:transition xmlns:p14="http://schemas.microsoft.com/office/powerpoint/2010/main" spd="slow" p14:dur="2000">
+        <p159:morph option="byObject"/>
+      </p:transition>
+    </mc:Choice>
+    <mc:Fallback>
+      <p:transition spd="slow">
+        <p:fade/>
+      </p:transition>
+    </mc:Fallback>
+  </mc:AlternateContent>
+</p:sld>
+</file>
+
+<file path=ppt/slides/slide18.xml><?xml version="1.0" encoding="utf-8"?>
+<p:sld xmlns:a="http://schemas.openxmlformats.org/drawingml/2006/main" xmlns:r="http://schemas.openxmlformats.org/officeDocument/2006/relationships" xmlns:p="http://schemas.openxmlformats.org/presentationml/2006/main">
+  <p:cSld>
+    <p:spTree>
+      <p:nvGrpSpPr>
+        <p:cNvPr id="1" name=""/>
+        <p:cNvGrpSpPr/>
+        <p:nvPr/>
+      </p:nvGrpSpPr>
+      <p:grpSpPr>
+        <a:xfrm>
+          <a:off x="0" y="0"/>
+          <a:ext cx="0" cy="0"/>
+          <a:chOff x="0" y="0"/>
+          <a:chExt cx="0" cy="0"/>
+        </a:xfrm>
+      </p:grpSpPr>
+      <p:sp>
+        <p:nvSpPr>
+          <p:cNvPr id="8" name="background">
+            <a:extLst>
+              <a:ext uri="{FF2B5EF4-FFF2-40B4-BE49-F238E27FC236}">
+                <a16:creationId xmlns:a16="http://schemas.microsoft.com/office/drawing/2014/main" id="{75CCBFB6-D148-00D8-9765-B97AFB750043}"/>
+              </a:ext>
+            </a:extLst>
+          </p:cNvPr>
+          <p:cNvSpPr>
+            <a:spLocks noGrp="1" noRot="1" noMove="1" noResize="1" noEditPoints="1" noAdjustHandles="1" noChangeArrowheads="1" noChangeShapeType="1"/>
+          </p:cNvSpPr>
+          <p:nvPr/>
+        </p:nvSpPr>
+        <p:spPr>
+          <a:xfrm>
+            <a:off x="1" y="0"/>
+            <a:ext cx="12192000" cy="6858000"/>
+          </a:xfrm>
+          <a:prstGeom prst="rect">
+            <a:avLst/>
+          </a:prstGeom>
+          <a:solidFill>
+            <a:srgbClr val="FDFBFF"/>
+          </a:solidFill>
+        </p:spPr>
+        <p:style>
+          <a:lnRef idx="2">
+            <a:schemeClr val="accent1">
+              <a:shade val="50000"/>
+            </a:schemeClr>
+          </a:lnRef>
+          <a:fillRef idx="1">
+            <a:schemeClr val="accent1"/>
+          </a:fillRef>
+          <a:effectRef idx="0">
+            <a:schemeClr val="accent1"/>
+          </a:effectRef>
+          <a:fontRef idx="minor">
+            <a:schemeClr val="lt1"/>
+          </a:fontRef>
+        </p:style>
+        <p:txBody>
+          <a:bodyPr rtlCol="0" anchor="ctr"/>
+          <a:lstStyle/>
+          <a:p>
+            <a:pPr algn="ctr"/>
+            <a:endParaRPr lang="pt-BR" sz="1355" dirty="0">
+              <a:latin typeface="Quicksand" panose="00000500000000000000" pitchFamily="2" charset="0"/>
+            </a:endParaRPr>
+          </a:p>
+        </p:txBody>
+      </p:sp>
+      <p:sp>
+        <p:nvSpPr>
+          <p:cNvPr id="9" name="TextBox 11">
+            <a:extLst>
+              <a:ext uri="{FF2B5EF4-FFF2-40B4-BE49-F238E27FC236}">
+                <a16:creationId xmlns:a16="http://schemas.microsoft.com/office/drawing/2014/main" id="{885A8FC7-3B65-D380-0FEA-DA33D6BF3F02}"/>
+              </a:ext>
+            </a:extLst>
+          </p:cNvPr>
+          <p:cNvSpPr txBox="1"/>
+          <p:nvPr/>
+        </p:nvSpPr>
+        <p:spPr>
+          <a:xfrm>
+            <a:off x="9336893" y="-601014"/>
+            <a:ext cx="2747266" cy="461665"/>
+          </a:xfrm>
+          <a:prstGeom prst="rect">
+            <a:avLst/>
+          </a:prstGeom>
+          <a:noFill/>
+        </p:spPr>
+        <p:txBody>
+          <a:bodyPr rot="0" spcFirstLastPara="0" vertOverflow="overflow" horzOverflow="overflow" vert="horz" wrap="square" lIns="91440" tIns="45720" rIns="91440" bIns="45720" numCol="1" spcCol="0" rtlCol="0" fromWordArt="0" anchor="t" anchorCtr="0" forceAA="0" compatLnSpc="1">
+            <a:prstTxWarp prst="textNoShape">
+              <a:avLst/>
+            </a:prstTxWarp>
+            <a:spAutoFit/>
+          </a:bodyPr>
+          <a:lstStyle/>
+          <a:p>
+            <a:pPr algn="l"/>
+            <a:r>
+              <a:rPr lang="en-US" sz="2400" dirty="0" err="1">
+                <a:solidFill>
+                  <a:srgbClr val="7030A0"/>
+                </a:solidFill>
+                <a:latin typeface="Raleway" pitchFamily="2" charset="0"/>
+                <a:cs typeface="Calibri"/>
+              </a:rPr>
+              <a:t>desenvolvimento</a:t>
+            </a:r>
+            <a:endParaRPr lang="en-US" sz="2400" dirty="0">
+              <a:solidFill>
+                <a:srgbClr val="7030A0"/>
+              </a:solidFill>
+              <a:latin typeface="Raleway" pitchFamily="2" charset="0"/>
+              <a:cs typeface="Calibri"/>
+            </a:endParaRPr>
+          </a:p>
+        </p:txBody>
+      </p:sp>
+      <p:sp>
+        <p:nvSpPr>
+          <p:cNvPr id="10" name="Elipse 9">
+            <a:extLst>
+              <a:ext uri="{FF2B5EF4-FFF2-40B4-BE49-F238E27FC236}">
+                <a16:creationId xmlns:a16="http://schemas.microsoft.com/office/drawing/2014/main" id="{54C59E0B-9841-C2C1-E264-279317C2B7C7}"/>
+              </a:ext>
+            </a:extLst>
+          </p:cNvPr>
+          <p:cNvSpPr/>
+          <p:nvPr/>
+        </p:nvSpPr>
+        <p:spPr>
+          <a:xfrm>
+            <a:off x="8742302" y="-627911"/>
+            <a:ext cx="515461" cy="515461"/>
+          </a:xfrm>
+          <a:prstGeom prst="ellipse">
+            <a:avLst/>
+          </a:prstGeom>
+          <a:solidFill>
+            <a:srgbClr val="8403E8"/>
+          </a:solidFill>
+          <a:ln>
+            <a:noFill/>
+          </a:ln>
+        </p:spPr>
+        <p:style>
+          <a:lnRef idx="2">
+            <a:schemeClr val="accent1">
+              <a:shade val="50000"/>
+            </a:schemeClr>
+          </a:lnRef>
+          <a:fillRef idx="1">
+            <a:schemeClr val="accent1"/>
+          </a:fillRef>
+          <a:effectRef idx="0">
+            <a:schemeClr val="accent1"/>
+          </a:effectRef>
+          <a:fontRef idx="minor">
+            <a:schemeClr val="lt1"/>
+          </a:fontRef>
+        </p:style>
+        <p:txBody>
+          <a:bodyPr rtlCol="0" anchor="ctr"/>
+          <a:lstStyle/>
+          <a:p>
+            <a:pPr algn="ctr"/>
+            <a:endParaRPr lang="pt-BR"/>
+          </a:p>
+        </p:txBody>
+      </p:sp>
+      <p:pic>
+        <p:nvPicPr>
+          <p:cNvPr id="22" name="Imagem 21">
+            <a:extLst>
+              <a:ext uri="{FF2B5EF4-FFF2-40B4-BE49-F238E27FC236}">
+                <a16:creationId xmlns:a16="http://schemas.microsoft.com/office/drawing/2014/main" id="{2967E298-6994-1835-F34C-4CFBF95FF3EE}"/>
+              </a:ext>
+            </a:extLst>
+          </p:cNvPr>
+          <p:cNvPicPr>
+            <a:picLocks noChangeAspect="1"/>
+          </p:cNvPicPr>
+          <p:nvPr/>
+        </p:nvPicPr>
+        <p:blipFill rotWithShape="1">
+          <a:blip r:embed="rId2"/>
+          <a:srcRect l="13333" r="7604" b="51835"/>
+          <a:stretch/>
+        </p:blipFill>
+        <p:spPr>
+          <a:xfrm>
+            <a:off x="1276350" y="1761959"/>
+            <a:ext cx="9639300" cy="3334081"/>
+          </a:xfrm>
+          <a:prstGeom prst="rect">
+            <a:avLst/>
+          </a:prstGeom>
+        </p:spPr>
+      </p:pic>
+      <p:pic>
+        <p:nvPicPr>
+          <p:cNvPr id="5" name="!!img">
+            <a:extLst>
+              <a:ext uri="{FF2B5EF4-FFF2-40B4-BE49-F238E27FC236}">
+                <a16:creationId xmlns:a16="http://schemas.microsoft.com/office/drawing/2014/main" id="{97C3B8C6-BA62-D340-CAE7-34481E029DD0}"/>
+              </a:ext>
+            </a:extLst>
+          </p:cNvPr>
+          <p:cNvPicPr>
+            <a:picLocks noChangeAspect="1"/>
+          </p:cNvPicPr>
+          <p:nvPr/>
+        </p:nvPicPr>
+        <p:blipFill>
+          <a:blip r:embed="rId3">
+            <a:alphaModFix amt="20000"/>
+            <a:extLst>
+              <a:ext uri="{28A0092B-C50C-407E-A947-70E740481C1C}">
+                <a14:useLocalDpi xmlns:a14="http://schemas.microsoft.com/office/drawing/2010/main" val="0"/>
+              </a:ext>
+            </a:extLst>
+          </a:blip>
+          <a:srcRect/>
+          <a:stretch/>
+        </p:blipFill>
+        <p:spPr>
+          <a:xfrm rot="21329866">
+            <a:off x="-3032327" y="3934899"/>
+            <a:ext cx="7302127" cy="6980654"/>
+          </a:xfrm>
+          <a:prstGeom prst="rect">
+            <a:avLst/>
+          </a:prstGeom>
+        </p:spPr>
+      </p:pic>
+      <p:sp>
+        <p:nvSpPr>
+          <p:cNvPr id="6" name="CaixaDeTexto 5">
+            <a:extLst>
+              <a:ext uri="{FF2B5EF4-FFF2-40B4-BE49-F238E27FC236}">
+                <a16:creationId xmlns:a16="http://schemas.microsoft.com/office/drawing/2014/main" id="{DADE5948-AA06-24D5-5741-52C6B88C35B7}"/>
+              </a:ext>
+            </a:extLst>
+          </p:cNvPr>
+          <p:cNvSpPr txBox="1">
+            <a:spLocks noGrp="1" noRot="1" noMove="1" noResize="1" noEditPoints="1" noAdjustHandles="1" noChangeArrowheads="1" noChangeShapeType="1"/>
+          </p:cNvSpPr>
+          <p:nvPr/>
+        </p:nvSpPr>
+        <p:spPr>
+          <a:xfrm>
+            <a:off x="7154844" y="6048609"/>
+            <a:ext cx="7759004" cy="769441"/>
+          </a:xfrm>
+          <a:prstGeom prst="rect">
+            <a:avLst/>
+          </a:prstGeom>
+          <a:noFill/>
+          <a:ln>
+            <a:noFill/>
+          </a:ln>
+        </p:spPr>
+        <p:txBody>
+          <a:bodyPr wrap="square" rtlCol="0">
+            <a:spAutoFit/>
+          </a:bodyPr>
+          <a:lstStyle/>
+          <a:p>
+            <a:pPr algn="ctr"/>
+            <a:r>
+              <a:rPr lang="pt-BR" sz="4400" dirty="0">
+                <a:ln>
+                  <a:solidFill>
+                    <a:srgbClr val="8403E8"/>
+                  </a:solidFill>
+                </a:ln>
+                <a:noFill/>
+                <a:latin typeface="Raleway" panose="020B0604020202020204" pitchFamily="2" charset="0"/>
+                <a:cs typeface="Quire Sans" panose="020B0502040204020203" pitchFamily="34" charset="0"/>
+              </a:rPr>
+              <a:t>TÊXTIL</a:t>
+            </a:r>
+          </a:p>
+        </p:txBody>
+      </p:sp>
+      <p:sp>
+        <p:nvSpPr>
+          <p:cNvPr id="7" name="CaixaDeTexto 6">
+            <a:extLst>
+              <a:ext uri="{FF2B5EF4-FFF2-40B4-BE49-F238E27FC236}">
+                <a16:creationId xmlns:a16="http://schemas.microsoft.com/office/drawing/2014/main" id="{330E2851-6925-214F-6C57-EB7B21D726F8}"/>
+              </a:ext>
+            </a:extLst>
+          </p:cNvPr>
+          <p:cNvSpPr txBox="1"/>
+          <p:nvPr/>
+        </p:nvSpPr>
+        <p:spPr>
+          <a:xfrm>
+            <a:off x="-677011" y="105864"/>
+            <a:ext cx="3328272" cy="769441"/>
+          </a:xfrm>
+          <a:prstGeom prst="rect">
+            <a:avLst/>
+          </a:prstGeom>
+          <a:noFill/>
+          <a:ln>
+            <a:noFill/>
+          </a:ln>
+        </p:spPr>
+        <p:txBody>
+          <a:bodyPr wrap="square" lIns="91440" tIns="45720" rIns="91440" bIns="45720" rtlCol="0" anchor="t">
+            <a:spAutoFit/>
+          </a:bodyPr>
+          <a:lstStyle/>
+          <a:p>
+            <a:pPr algn="ctr"/>
+            <a:r>
+              <a:rPr lang="pt-BR" sz="4400" dirty="0">
+                <a:solidFill>
+                  <a:srgbClr val="8403E8"/>
+                </a:solidFill>
+                <a:latin typeface="Raleway"/>
+                <a:cs typeface="Quire Sans"/>
+              </a:rPr>
+              <a:t>OMNI</a:t>
+            </a:r>
+          </a:p>
+        </p:txBody>
+      </p:sp>
+    </p:spTree>
+    <p:extLst>
+      <p:ext uri="{BB962C8B-B14F-4D97-AF65-F5344CB8AC3E}">
+        <p14:creationId xmlns:p14="http://schemas.microsoft.com/office/powerpoint/2010/main" val="2517049304"/>
+      </p:ext>
+    </p:extLst>
+  </p:cSld>
+  <p:clrMapOvr>
+    <a:masterClrMapping/>
+  </p:clrMapOvr>
+  <mc:AlternateContent xmlns:mc="http://schemas.openxmlformats.org/markup-compatibility/2006">
+    <mc:Choice xmlns:p159="http://schemas.microsoft.com/office/powerpoint/2015/09/main" Requires="p159">
+      <p:transition xmlns:p14="http://schemas.microsoft.com/office/powerpoint/2010/main" spd="slow" p14:dur="2000">
+        <p159:morph option="byObject"/>
+      </p:transition>
+    </mc:Choice>
+    <mc:Fallback>
+      <p:transition spd="slow">
+        <p:fade/>
+      </p:transition>
+    </mc:Fallback>
+  </mc:AlternateContent>
+</p:sld>
+</file>
+
+<file path=ppt/slides/slide19.xml><?xml version="1.0" encoding="utf-8"?>
+<p:sld xmlns:a="http://schemas.openxmlformats.org/drawingml/2006/main" xmlns:r="http://schemas.openxmlformats.org/officeDocument/2006/relationships" xmlns:p="http://schemas.openxmlformats.org/presentationml/2006/main">
+  <p:cSld>
+    <p:spTree>
+      <p:nvGrpSpPr>
+        <p:cNvPr id="1" name=""/>
+        <p:cNvGrpSpPr/>
+        <p:nvPr/>
+      </p:nvGrpSpPr>
+      <p:grpSpPr>
+        <a:xfrm>
+          <a:off x="0" y="0"/>
+          <a:ext cx="0" cy="0"/>
+          <a:chOff x="0" y="0"/>
+          <a:chExt cx="0" cy="0"/>
+        </a:xfrm>
+      </p:grpSpPr>
+      <p:sp>
+        <p:nvSpPr>
+          <p:cNvPr id="9" name="TextBox 11">
+            <a:extLst>
+              <a:ext uri="{FF2B5EF4-FFF2-40B4-BE49-F238E27FC236}">
+                <a16:creationId xmlns:a16="http://schemas.microsoft.com/office/drawing/2014/main" id="{885A8FC7-3B65-D380-0FEA-DA33D6BF3F02}"/>
+              </a:ext>
+            </a:extLst>
+          </p:cNvPr>
+          <p:cNvSpPr txBox="1"/>
+          <p:nvPr/>
+        </p:nvSpPr>
+        <p:spPr>
+          <a:xfrm>
+            <a:off x="9336893" y="-601014"/>
+            <a:ext cx="2747266" cy="461665"/>
+          </a:xfrm>
+          <a:prstGeom prst="rect">
+            <a:avLst/>
+          </a:prstGeom>
+          <a:noFill/>
+        </p:spPr>
+        <p:txBody>
+          <a:bodyPr rot="0" spcFirstLastPara="0" vertOverflow="overflow" horzOverflow="overflow" vert="horz" wrap="square" lIns="91440" tIns="45720" rIns="91440" bIns="45720" numCol="1" spcCol="0" rtlCol="0" fromWordArt="0" anchor="t" anchorCtr="0" forceAA="0" compatLnSpc="1">
+            <a:prstTxWarp prst="textNoShape">
+              <a:avLst/>
+            </a:prstTxWarp>
+            <a:spAutoFit/>
+          </a:bodyPr>
+          <a:lstStyle/>
+          <a:p>
+            <a:pPr algn="l"/>
+            <a:r>
+              <a:rPr lang="en-US" sz="2400" dirty="0" err="1">
+                <a:solidFill>
+                  <a:srgbClr val="7030A0"/>
+                </a:solidFill>
+                <a:latin typeface="Raleway" pitchFamily="2" charset="0"/>
+                <a:cs typeface="Calibri"/>
+              </a:rPr>
+              <a:t>desenvolvimento</a:t>
+            </a:r>
+            <a:endParaRPr lang="en-US" sz="2400" dirty="0">
+              <a:solidFill>
+                <a:srgbClr val="7030A0"/>
+              </a:solidFill>
+              <a:latin typeface="Raleway" pitchFamily="2" charset="0"/>
+              <a:cs typeface="Calibri"/>
+            </a:endParaRPr>
+          </a:p>
+        </p:txBody>
+      </p:sp>
+      <p:sp>
+        <p:nvSpPr>
+          <p:cNvPr id="10" name="Elipse 9">
+            <a:extLst>
+              <a:ext uri="{FF2B5EF4-FFF2-40B4-BE49-F238E27FC236}">
+                <a16:creationId xmlns:a16="http://schemas.microsoft.com/office/drawing/2014/main" id="{54C59E0B-9841-C2C1-E264-279317C2B7C7}"/>
+              </a:ext>
+            </a:extLst>
+          </p:cNvPr>
+          <p:cNvSpPr/>
+          <p:nvPr/>
+        </p:nvSpPr>
+        <p:spPr>
+          <a:xfrm>
+            <a:off x="8742302" y="-627911"/>
+            <a:ext cx="515461" cy="515461"/>
+          </a:xfrm>
+          <a:prstGeom prst="ellipse">
+            <a:avLst/>
+          </a:prstGeom>
+          <a:solidFill>
+            <a:srgbClr val="8403E8"/>
+          </a:solidFill>
+          <a:ln>
+            <a:noFill/>
+          </a:ln>
+        </p:spPr>
+        <p:style>
+          <a:lnRef idx="2">
+            <a:schemeClr val="accent1">
+              <a:shade val="50000"/>
+            </a:schemeClr>
+          </a:lnRef>
+          <a:fillRef idx="1">
+            <a:schemeClr val="accent1"/>
+          </a:fillRef>
+          <a:effectRef idx="0">
+            <a:schemeClr val="accent1"/>
+          </a:effectRef>
+          <a:fontRef idx="minor">
+            <a:schemeClr val="lt1"/>
+          </a:fontRef>
+        </p:style>
+        <p:txBody>
+          <a:bodyPr rtlCol="0" anchor="ctr"/>
+          <a:lstStyle/>
+          <a:p>
+            <a:pPr algn="ctr"/>
+            <a:endParaRPr lang="pt-BR"/>
+          </a:p>
+        </p:txBody>
+      </p:sp>
+      <p:pic>
+        <p:nvPicPr>
+          <p:cNvPr id="5" name="Imagem 4">
+            <a:extLst>
+              <a:ext uri="{FF2B5EF4-FFF2-40B4-BE49-F238E27FC236}">
+                <a16:creationId xmlns:a16="http://schemas.microsoft.com/office/drawing/2014/main" id="{ADA41DB6-CADE-15FE-410E-DB1956E8A2E3}"/>
+              </a:ext>
+            </a:extLst>
+          </p:cNvPr>
+          <p:cNvPicPr>
+            <a:picLocks noChangeAspect="1"/>
+          </p:cNvPicPr>
+          <p:nvPr/>
+        </p:nvPicPr>
+        <p:blipFill>
+          <a:blip r:embed="rId2"/>
+          <a:stretch>
+            <a:fillRect/>
+          </a:stretch>
+        </p:blipFill>
+        <p:spPr>
+          <a:xfrm>
+            <a:off x="-8696" y="0"/>
+            <a:ext cx="12209392" cy="6858000"/>
+          </a:xfrm>
+          <a:prstGeom prst="rect">
+            <a:avLst/>
+          </a:prstGeom>
+        </p:spPr>
+      </p:pic>
+    </p:spTree>
+    <p:extLst>
+      <p:ext uri="{BB962C8B-B14F-4D97-AF65-F5344CB8AC3E}">
+        <p14:creationId xmlns:p14="http://schemas.microsoft.com/office/powerpoint/2010/main" val="2900992212"/>
+      </p:ext>
+    </p:extLst>
+  </p:cSld>
+  <p:clrMapOvr>
+    <a:masterClrMapping/>
+  </p:clrMapOvr>
+  <mc:AlternateContent xmlns:mc="http://schemas.openxmlformats.org/markup-compatibility/2006">
+    <mc:Choice xmlns:p159="http://schemas.microsoft.com/office/powerpoint/2015/09/main" Requires="p159">
+      <p:transition xmlns:p14="http://schemas.microsoft.com/office/powerpoint/2010/main" spd="slow" p14:dur="2000">
+        <p159:morph option="byObject"/>
+      </p:transition>
+    </mc:Choice>
+    <mc:Fallback>
+      <p:transition spd="slow">
+        <p:fade/>
+      </p:transition>
+    </mc:Fallback>
+  </mc:AlternateContent>
+</p:sld>
+</file>
+
+<file path=ppt/slides/slide2.xml><?xml version="1.0" encoding="utf-8"?>
+<p:sld xmlns:a="http://schemas.openxmlformats.org/drawingml/2006/main" xmlns:r="http://schemas.openxmlformats.org/officeDocument/2006/relationships" xmlns:p="http://schemas.openxmlformats.org/presentationml/2006/main">
+  <p:cSld>
+    <p:spTree>
+      <p:nvGrpSpPr>
+        <p:cNvPr id="1" name=""/>
+        <p:cNvGrpSpPr/>
+        <p:nvPr/>
+      </p:nvGrpSpPr>
+      <p:grpSpPr>
+        <a:xfrm>
+          <a:off x="0" y="0"/>
+          <a:ext cx="0" cy="0"/>
+          <a:chOff x="0" y="0"/>
+          <a:chExt cx="0" cy="0"/>
+        </a:xfrm>
+      </p:grpSpPr>
+      <p:pic>
+        <p:nvPicPr>
+          <p:cNvPr id="5" name="Imagem 4" descr="Forma&#10;&#10;Descrição gerada automaticamente com confiança média">
+            <a:extLst>
+              <a:ext uri="{FF2B5EF4-FFF2-40B4-BE49-F238E27FC236}">
+                <a16:creationId xmlns:a16="http://schemas.microsoft.com/office/drawing/2014/main" id="{D9891E25-E261-DE6B-4C99-03057FD639EC}"/>
+              </a:ext>
+            </a:extLst>
+          </p:cNvPr>
+          <p:cNvPicPr>
+            <a:picLocks noChangeAspect="1"/>
+          </p:cNvPicPr>
+          <p:nvPr/>
+        </p:nvPicPr>
+        <p:blipFill>
+          <a:blip r:embed="rId2">
+            <a:extLst>
+              <a:ext uri="{28A0092B-C50C-407E-A947-70E740481C1C}">
+                <a14:useLocalDpi xmlns:a14="http://schemas.microsoft.com/office/drawing/2010/main" val="0"/>
+              </a:ext>
+            </a:extLst>
+          </a:blip>
+          <a:stretch>
+            <a:fillRect/>
+          </a:stretch>
+        </p:blipFill>
+        <p:spPr>
+          <a:xfrm rot="5820100">
+            <a:off x="2143286" y="1184101"/>
+            <a:ext cx="2299306" cy="2198079"/>
+          </a:xfrm>
+          <a:prstGeom prst="rect">
+            <a:avLst/>
+          </a:prstGeom>
+        </p:spPr>
+      </p:pic>
+      <p:sp>
+        <p:nvSpPr>
+          <p:cNvPr id="6" name="CaixaDeTexto 5">
+            <a:extLst>
+              <a:ext uri="{FF2B5EF4-FFF2-40B4-BE49-F238E27FC236}">
+                <a16:creationId xmlns:a16="http://schemas.microsoft.com/office/drawing/2014/main" id="{85371403-D354-8958-402C-293CC95B1D32}"/>
+              </a:ext>
+            </a:extLst>
+          </p:cNvPr>
+          <p:cNvSpPr txBox="1"/>
+          <p:nvPr/>
+        </p:nvSpPr>
+        <p:spPr>
+          <a:xfrm>
+            <a:off x="3765680" y="2283140"/>
+            <a:ext cx="5659643" cy="923330"/>
+          </a:xfrm>
+          <a:prstGeom prst="rect">
+            <a:avLst/>
+          </a:prstGeom>
+          <a:noFill/>
+          <a:ln>
+            <a:noFill/>
+          </a:ln>
+        </p:spPr>
+        <p:txBody>
+          <a:bodyPr wrap="square" rtlCol="0">
+            <a:spAutoFit/>
+          </a:bodyPr>
+          <a:lstStyle/>
+          <a:p>
+            <a:pPr algn="ctr"/>
+            <a:r>
+              <a:rPr lang="pt-BR" sz="5400" dirty="0">
+                <a:ln>
+                  <a:solidFill>
+                    <a:sysClr val="windowText" lastClr="000000"/>
+                  </a:solidFill>
+                </a:ln>
+                <a:noFill/>
+                <a:latin typeface="Raleway" panose="020B0604020202020204" pitchFamily="2" charset="0"/>
+                <a:cs typeface="Quire Sans" panose="020B0502040204020203" pitchFamily="34" charset="0"/>
+              </a:rPr>
+              <a:t>SOLUTIONS</a:t>
+            </a:r>
+          </a:p>
+        </p:txBody>
+      </p:sp>
+      <p:sp>
+        <p:nvSpPr>
+          <p:cNvPr id="4" name="CaixaDeTexto 3">
+            <a:extLst>
+              <a:ext uri="{FF2B5EF4-FFF2-40B4-BE49-F238E27FC236}">
+                <a16:creationId xmlns:a16="http://schemas.microsoft.com/office/drawing/2014/main" id="{C36ED40B-E864-1ECA-07DE-82704BDCC929}"/>
+              </a:ext>
+            </a:extLst>
+          </p:cNvPr>
+          <p:cNvSpPr txBox="1"/>
+          <p:nvPr/>
+        </p:nvSpPr>
+        <p:spPr>
+          <a:xfrm>
+            <a:off x="5381632" y="1469753"/>
+            <a:ext cx="2427738" cy="923330"/>
+          </a:xfrm>
+          <a:prstGeom prst="rect">
+            <a:avLst/>
+          </a:prstGeom>
+          <a:noFill/>
+          <a:ln>
+            <a:noFill/>
+          </a:ln>
+        </p:spPr>
+        <p:txBody>
+          <a:bodyPr wrap="square" rtlCol="0">
+            <a:spAutoFit/>
+          </a:bodyPr>
+          <a:lstStyle/>
+          <a:p>
+            <a:pPr algn="ctr"/>
+            <a:r>
+              <a:rPr lang="pt-BR" sz="5400" dirty="0">
+                <a:solidFill>
+                  <a:schemeClr val="tx1">
+                    <a:lumMod val="85000"/>
+                    <a:lumOff val="15000"/>
+                  </a:schemeClr>
+                </a:solidFill>
+                <a:latin typeface="Raleway" panose="020B0604020202020204" pitchFamily="2" charset="0"/>
+                <a:cs typeface="Quire Sans" panose="020B0502040204020203" pitchFamily="34" charset="0"/>
+              </a:rPr>
+              <a:t>OMNI</a:t>
+            </a:r>
+          </a:p>
+        </p:txBody>
+      </p:sp>
+      <p:sp>
+        <p:nvSpPr>
+          <p:cNvPr id="7" name="nomes1">
+            <a:extLst>
+              <a:ext uri="{FF2B5EF4-FFF2-40B4-BE49-F238E27FC236}">
+                <a16:creationId xmlns:a16="http://schemas.microsoft.com/office/drawing/2014/main" id="{FD5861A7-EBFF-89E2-F90E-12E5DBDFDB03}"/>
+              </a:ext>
+            </a:extLst>
+          </p:cNvPr>
+          <p:cNvSpPr txBox="1"/>
+          <p:nvPr/>
+        </p:nvSpPr>
+        <p:spPr>
+          <a:xfrm>
+            <a:off x="1400944" y="4430575"/>
+            <a:ext cx="3312000" cy="1620000"/>
+          </a:xfrm>
+          <a:prstGeom prst="rect">
+            <a:avLst/>
+          </a:prstGeom>
+          <a:noFill/>
+        </p:spPr>
+        <p:txBody>
+          <a:bodyPr wrap="square" rtlCol="0" anchor="ctr">
+            <a:spAutoFit/>
+          </a:bodyPr>
+          <a:lstStyle/>
+          <a:p>
+            <a:pPr marL="457200" indent="-457200">
+              <a:buFont typeface="Courier New" panose="02070309020205020404" pitchFamily="49" charset="0"/>
+              <a:buChar char="o"/>
+            </a:pPr>
+            <a:r>
+              <a:rPr lang="pt-BR" sz="2800" dirty="0">
+                <a:solidFill>
+                  <a:schemeClr val="tx1">
+                    <a:lumMod val="85000"/>
+                    <a:lumOff val="15000"/>
+                  </a:schemeClr>
+                </a:solidFill>
+                <a:latin typeface="Raleway" pitchFamily="2" charset="0"/>
+              </a:rPr>
+              <a:t>Eduarda Calixto</a:t>
+            </a:r>
+          </a:p>
+          <a:p>
+            <a:pPr marL="457200" indent="-457200">
+              <a:buFont typeface="Courier New" panose="02070309020205020404" pitchFamily="49" charset="0"/>
+              <a:buChar char="o"/>
+            </a:pPr>
+            <a:r>
+              <a:rPr lang="pt-BR" sz="2800" dirty="0">
+                <a:solidFill>
+                  <a:schemeClr val="tx1">
+                    <a:lumMod val="85000"/>
+                    <a:lumOff val="15000"/>
+                  </a:schemeClr>
+                </a:solidFill>
+                <a:latin typeface="Raleway" pitchFamily="2" charset="0"/>
+              </a:rPr>
+              <a:t>Fábio Ceslaki</a:t>
+            </a:r>
+          </a:p>
+          <a:p>
+            <a:pPr marL="457200" indent="-457200">
+              <a:buFont typeface="Courier New" panose="02070309020205020404" pitchFamily="49" charset="0"/>
+              <a:buChar char="o"/>
+            </a:pPr>
+            <a:r>
+              <a:rPr lang="pt-BR" sz="2800" dirty="0">
+                <a:solidFill>
+                  <a:schemeClr val="tx1">
+                    <a:lumMod val="85000"/>
+                    <a:lumOff val="15000"/>
+                  </a:schemeClr>
+                </a:solidFill>
+                <a:latin typeface="Raleway" pitchFamily="2" charset="0"/>
+              </a:rPr>
+              <a:t>Gabriel Martins </a:t>
+            </a:r>
+          </a:p>
+        </p:txBody>
+      </p:sp>
+      <p:sp>
+        <p:nvSpPr>
+          <p:cNvPr id="8" name="nomes2">
+            <a:extLst>
+              <a:ext uri="{FF2B5EF4-FFF2-40B4-BE49-F238E27FC236}">
+                <a16:creationId xmlns:a16="http://schemas.microsoft.com/office/drawing/2014/main" id="{369AD351-D921-3AE9-6DB6-FC90E1E40613}"/>
+              </a:ext>
+            </a:extLst>
+          </p:cNvPr>
+          <p:cNvSpPr txBox="1"/>
+          <p:nvPr/>
+        </p:nvSpPr>
+        <p:spPr>
+          <a:xfrm>
+            <a:off x="7602866" y="4430575"/>
+            <a:ext cx="3595222" cy="1384995"/>
+          </a:xfrm>
+          <a:prstGeom prst="rect">
+            <a:avLst/>
+          </a:prstGeom>
+          <a:noFill/>
+        </p:spPr>
+        <p:txBody>
+          <a:bodyPr wrap="square" rtlCol="0">
+            <a:spAutoFit/>
+          </a:bodyPr>
+          <a:lstStyle/>
+          <a:p>
+            <a:pPr marL="457200" indent="-457200">
+              <a:buFont typeface="Courier New" panose="02070309020205020404" pitchFamily="49" charset="0"/>
+              <a:buChar char="o"/>
+            </a:pPr>
+            <a:r>
+              <a:rPr lang="pt-BR" sz="2800" dirty="0">
+                <a:solidFill>
+                  <a:schemeClr val="tx1">
+                    <a:lumMod val="85000"/>
+                    <a:lumOff val="15000"/>
+                  </a:schemeClr>
+                </a:solidFill>
+                <a:latin typeface="Raleway" pitchFamily="2" charset="0"/>
+              </a:rPr>
+              <a:t>Thiago Ramos</a:t>
+            </a:r>
+          </a:p>
+          <a:p>
+            <a:pPr marL="457200" indent="-457200">
+              <a:buFont typeface="Courier New" panose="02070309020205020404" pitchFamily="49" charset="0"/>
+              <a:buChar char="o"/>
+            </a:pPr>
+            <a:r>
+              <a:rPr lang="pt-BR" sz="2800" dirty="0">
+                <a:solidFill>
+                  <a:schemeClr val="tx1">
+                    <a:lumMod val="85000"/>
+                    <a:lumOff val="15000"/>
+                  </a:schemeClr>
+                </a:solidFill>
+                <a:latin typeface="Raleway" pitchFamily="2" charset="0"/>
+              </a:rPr>
+              <a:t>Vitor Mendes</a:t>
+            </a:r>
+          </a:p>
+          <a:p>
+            <a:pPr marL="457200" indent="-457200">
+              <a:buFont typeface="Courier New" panose="02070309020205020404" pitchFamily="49" charset="0"/>
+              <a:buChar char="o"/>
+            </a:pPr>
+            <a:r>
+              <a:rPr lang="pt-BR" sz="2800" dirty="0">
+                <a:solidFill>
+                  <a:schemeClr val="tx1">
+                    <a:lumMod val="85000"/>
+                    <a:lumOff val="15000"/>
+                  </a:schemeClr>
+                </a:solidFill>
+                <a:latin typeface="Raleway" pitchFamily="2" charset="0"/>
+              </a:rPr>
+              <a:t>Wladimir Condori</a:t>
+            </a:r>
+          </a:p>
+        </p:txBody>
+      </p:sp>
+    </p:spTree>
+    <p:extLst>
+      <p:ext uri="{BB962C8B-B14F-4D97-AF65-F5344CB8AC3E}">
+        <p14:creationId xmlns:p14="http://schemas.microsoft.com/office/powerpoint/2010/main" val="179938745"/>
+      </p:ext>
+    </p:extLst>
+  </p:cSld>
+  <p:clrMapOvr>
+    <a:masterClrMapping/>
+  </p:clrMapOvr>
+  <mc:AlternateContent xmlns:mc="http://schemas.openxmlformats.org/markup-compatibility/2006" xmlns:p159="http://schemas.microsoft.com/office/powerpoint/2015/09/main">
+    <mc:Choice Requires="p159">
+      <p:transition xmlns:p14="http://schemas.microsoft.com/office/powerpoint/2010/main" spd="slow" p14:dur="2000">
+        <p159:morph option="byObject"/>
+      </p:transition>
+    </mc:Choice>
+    <mc:Fallback xmlns="">
+      <p:transition spd="slow">
+        <p:fade/>
+      </p:transition>
+    </mc:Fallback>
+  </mc:AlternateContent>
+</p:sld>
+</file>
+
+<file path=ppt/slides/slide20.xml><?xml version="1.0" encoding="utf-8"?>
+<p:sld xmlns:a="http://schemas.openxmlformats.org/drawingml/2006/main" xmlns:r="http://schemas.openxmlformats.org/officeDocument/2006/relationships" xmlns:p="http://schemas.openxmlformats.org/presentationml/2006/main">
+  <p:cSld>
+    <p:spTree>
+      <p:nvGrpSpPr>
+        <p:cNvPr id="1" name=""/>
+        <p:cNvGrpSpPr/>
+        <p:nvPr/>
+      </p:nvGrpSpPr>
+      <p:grpSpPr>
+        <a:xfrm>
+          <a:off x="0" y="0"/>
+          <a:ext cx="0" cy="0"/>
+          <a:chOff x="0" y="0"/>
+          <a:chExt cx="0" cy="0"/>
+        </a:xfrm>
+      </p:grpSpPr>
+      <p:sp>
+        <p:nvSpPr>
+          <p:cNvPr id="11" name="background">
+            <a:extLst>
+              <a:ext uri="{FF2B5EF4-FFF2-40B4-BE49-F238E27FC236}">
+                <a16:creationId xmlns:a16="http://schemas.microsoft.com/office/drawing/2014/main" id="{4EEF6E71-2AFD-3F6F-9046-EE4B2D4D8787}"/>
+              </a:ext>
+            </a:extLst>
+          </p:cNvPr>
+          <p:cNvSpPr>
+            <a:spLocks noGrp="1" noRot="1" noMove="1" noResize="1" noEditPoints="1" noAdjustHandles="1" noChangeArrowheads="1" noChangeShapeType="1"/>
+          </p:cNvSpPr>
+          <p:nvPr/>
+        </p:nvSpPr>
+        <p:spPr>
+          <a:xfrm>
+            <a:off x="1" y="0"/>
+            <a:ext cx="12192000" cy="6858000"/>
+          </a:xfrm>
+          <a:prstGeom prst="rect">
+            <a:avLst/>
+          </a:prstGeom>
+          <a:solidFill>
+            <a:srgbClr val="FDFBFF"/>
+          </a:solidFill>
+        </p:spPr>
+        <p:style>
+          <a:lnRef idx="2">
+            <a:schemeClr val="accent1">
+              <a:shade val="50000"/>
+            </a:schemeClr>
+          </a:lnRef>
+          <a:fillRef idx="1">
+            <a:schemeClr val="accent1"/>
+          </a:fillRef>
+          <a:effectRef idx="0">
+            <a:schemeClr val="accent1"/>
+          </a:effectRef>
+          <a:fontRef idx="minor">
+            <a:schemeClr val="lt1"/>
+          </a:fontRef>
+        </p:style>
+        <p:txBody>
+          <a:bodyPr rtlCol="0" anchor="ctr"/>
+          <a:lstStyle/>
+          <a:p>
+            <a:pPr algn="ctr"/>
+            <a:endParaRPr lang="pt-BR" sz="1355" dirty="0">
+              <a:latin typeface="Quicksand" panose="00000500000000000000" pitchFamily="2" charset="0"/>
+            </a:endParaRPr>
+          </a:p>
+        </p:txBody>
+      </p:sp>
+      <p:sp>
+        <p:nvSpPr>
+          <p:cNvPr id="9" name="TextBox 11">
+            <a:extLst>
+              <a:ext uri="{FF2B5EF4-FFF2-40B4-BE49-F238E27FC236}">
+                <a16:creationId xmlns:a16="http://schemas.microsoft.com/office/drawing/2014/main" id="{885A8FC7-3B65-D380-0FEA-DA33D6BF3F02}"/>
+              </a:ext>
+            </a:extLst>
+          </p:cNvPr>
+          <p:cNvSpPr txBox="1"/>
+          <p:nvPr/>
+        </p:nvSpPr>
+        <p:spPr>
+          <a:xfrm>
+            <a:off x="9336893" y="-601014"/>
+            <a:ext cx="2747266" cy="461665"/>
+          </a:xfrm>
+          <a:prstGeom prst="rect">
+            <a:avLst/>
+          </a:prstGeom>
+          <a:noFill/>
+        </p:spPr>
+        <p:txBody>
+          <a:bodyPr rot="0" spcFirstLastPara="0" vertOverflow="overflow" horzOverflow="overflow" vert="horz" wrap="square" lIns="91440" tIns="45720" rIns="91440" bIns="45720" numCol="1" spcCol="0" rtlCol="0" fromWordArt="0" anchor="t" anchorCtr="0" forceAA="0" compatLnSpc="1">
+            <a:prstTxWarp prst="textNoShape">
+              <a:avLst/>
+            </a:prstTxWarp>
+            <a:spAutoFit/>
+          </a:bodyPr>
+          <a:lstStyle/>
+          <a:p>
+            <a:pPr algn="l"/>
+            <a:r>
+              <a:rPr lang="en-US" sz="2400" dirty="0" err="1">
+                <a:solidFill>
+                  <a:srgbClr val="7030A0"/>
+                </a:solidFill>
+                <a:latin typeface="Raleway" pitchFamily="2" charset="0"/>
+                <a:cs typeface="Calibri"/>
+              </a:rPr>
+              <a:t>desenvolvimento</a:t>
+            </a:r>
+            <a:endParaRPr lang="en-US" sz="2400" dirty="0">
+              <a:solidFill>
+                <a:srgbClr val="7030A0"/>
+              </a:solidFill>
+              <a:latin typeface="Raleway" pitchFamily="2" charset="0"/>
+              <a:cs typeface="Calibri"/>
+            </a:endParaRPr>
+          </a:p>
+        </p:txBody>
+      </p:sp>
+      <p:sp>
+        <p:nvSpPr>
+          <p:cNvPr id="10" name="Elipse 9">
+            <a:extLst>
+              <a:ext uri="{FF2B5EF4-FFF2-40B4-BE49-F238E27FC236}">
+                <a16:creationId xmlns:a16="http://schemas.microsoft.com/office/drawing/2014/main" id="{54C59E0B-9841-C2C1-E264-279317C2B7C7}"/>
+              </a:ext>
+            </a:extLst>
+          </p:cNvPr>
+          <p:cNvSpPr/>
+          <p:nvPr/>
+        </p:nvSpPr>
+        <p:spPr>
+          <a:xfrm>
+            <a:off x="8742302" y="-627911"/>
+            <a:ext cx="515461" cy="515461"/>
+          </a:xfrm>
+          <a:prstGeom prst="ellipse">
+            <a:avLst/>
+          </a:prstGeom>
+          <a:solidFill>
+            <a:srgbClr val="8403E8"/>
+          </a:solidFill>
+          <a:ln>
+            <a:noFill/>
+          </a:ln>
+        </p:spPr>
+        <p:style>
+          <a:lnRef idx="2">
+            <a:schemeClr val="accent1">
+              <a:shade val="50000"/>
+            </a:schemeClr>
+          </a:lnRef>
+          <a:fillRef idx="1">
+            <a:schemeClr val="accent1"/>
+          </a:fillRef>
+          <a:effectRef idx="0">
+            <a:schemeClr val="accent1"/>
+          </a:effectRef>
+          <a:fontRef idx="minor">
+            <a:schemeClr val="lt1"/>
+          </a:fontRef>
+        </p:style>
+        <p:txBody>
+          <a:bodyPr rtlCol="0" anchor="ctr"/>
+          <a:lstStyle/>
+          <a:p>
+            <a:pPr algn="ctr"/>
+            <a:endParaRPr lang="pt-BR"/>
+          </a:p>
+        </p:txBody>
+      </p:sp>
+      <p:pic>
+        <p:nvPicPr>
+          <p:cNvPr id="5" name="Imagem 4">
+            <a:extLst>
+              <a:ext uri="{FF2B5EF4-FFF2-40B4-BE49-F238E27FC236}">
+                <a16:creationId xmlns:a16="http://schemas.microsoft.com/office/drawing/2014/main" id="{ADA41DB6-CADE-15FE-410E-DB1956E8A2E3}"/>
+              </a:ext>
+            </a:extLst>
+          </p:cNvPr>
+          <p:cNvPicPr>
+            <a:picLocks noChangeAspect="1"/>
+          </p:cNvPicPr>
+          <p:nvPr/>
+        </p:nvPicPr>
+        <p:blipFill rotWithShape="1">
+          <a:blip r:embed="rId2"/>
+          <a:srcRect l="29508" t="22037" r="954" b="26852"/>
+          <a:stretch/>
+        </p:blipFill>
+        <p:spPr>
+          <a:xfrm>
+            <a:off x="1850970" y="1676400"/>
+            <a:ext cx="8490059" cy="3505200"/>
+          </a:xfrm>
+          <a:prstGeom prst="rect">
+            <a:avLst/>
+          </a:prstGeom>
+        </p:spPr>
+      </p:pic>
+      <p:pic>
+        <p:nvPicPr>
+          <p:cNvPr id="6" name="!!img">
+            <a:extLst>
+              <a:ext uri="{FF2B5EF4-FFF2-40B4-BE49-F238E27FC236}">
+                <a16:creationId xmlns:a16="http://schemas.microsoft.com/office/drawing/2014/main" id="{FDE36430-33AF-BF5F-DAB3-15F1DFFA2374}"/>
+              </a:ext>
+            </a:extLst>
+          </p:cNvPr>
+          <p:cNvPicPr>
+            <a:picLocks noChangeAspect="1"/>
+          </p:cNvPicPr>
+          <p:nvPr/>
+        </p:nvPicPr>
+        <p:blipFill>
+          <a:blip r:embed="rId3">
+            <a:alphaModFix amt="20000"/>
+            <a:extLst>
+              <a:ext uri="{28A0092B-C50C-407E-A947-70E740481C1C}">
+                <a14:useLocalDpi xmlns:a14="http://schemas.microsoft.com/office/drawing/2010/main" val="0"/>
+              </a:ext>
+            </a:extLst>
+          </a:blip>
+          <a:srcRect/>
+          <a:stretch/>
+        </p:blipFill>
+        <p:spPr>
+          <a:xfrm rot="21329866">
+            <a:off x="-3032327" y="3934899"/>
+            <a:ext cx="7302127" cy="6980654"/>
+          </a:xfrm>
+          <a:prstGeom prst="rect">
+            <a:avLst/>
+          </a:prstGeom>
+        </p:spPr>
+      </p:pic>
+      <p:sp>
+        <p:nvSpPr>
+          <p:cNvPr id="7" name="CaixaDeTexto 6">
+            <a:extLst>
+              <a:ext uri="{FF2B5EF4-FFF2-40B4-BE49-F238E27FC236}">
+                <a16:creationId xmlns:a16="http://schemas.microsoft.com/office/drawing/2014/main" id="{3C00BADE-E333-63BD-5C6E-94D9D7F0EF01}"/>
+              </a:ext>
+            </a:extLst>
+          </p:cNvPr>
+          <p:cNvSpPr txBox="1"/>
+          <p:nvPr/>
+        </p:nvSpPr>
+        <p:spPr>
+          <a:xfrm>
+            <a:off x="7154844" y="6048609"/>
+            <a:ext cx="7759004" cy="769441"/>
+          </a:xfrm>
+          <a:prstGeom prst="rect">
+            <a:avLst/>
+          </a:prstGeom>
+          <a:noFill/>
+          <a:ln>
+            <a:noFill/>
+          </a:ln>
+        </p:spPr>
+        <p:txBody>
+          <a:bodyPr wrap="square" rtlCol="0">
+            <a:spAutoFit/>
+          </a:bodyPr>
+          <a:lstStyle/>
+          <a:p>
+            <a:pPr algn="ctr"/>
+            <a:r>
+              <a:rPr lang="pt-BR" sz="4400" dirty="0">
+                <a:ln>
+                  <a:solidFill>
+                    <a:srgbClr val="8403E8"/>
+                  </a:solidFill>
+                </a:ln>
+                <a:noFill/>
+                <a:latin typeface="Raleway" panose="020B0604020202020204" pitchFamily="2" charset="0"/>
+                <a:cs typeface="Quire Sans" panose="020B0502040204020203" pitchFamily="34" charset="0"/>
+              </a:rPr>
+              <a:t>TÊXTIL</a:t>
+            </a:r>
+          </a:p>
+        </p:txBody>
+      </p:sp>
+      <p:sp>
+        <p:nvSpPr>
+          <p:cNvPr id="8" name="CaixaDeTexto 7">
+            <a:extLst>
+              <a:ext uri="{FF2B5EF4-FFF2-40B4-BE49-F238E27FC236}">
+                <a16:creationId xmlns:a16="http://schemas.microsoft.com/office/drawing/2014/main" id="{0F487133-E52F-354F-D4FD-CC35BD6E7E19}"/>
+              </a:ext>
+            </a:extLst>
+          </p:cNvPr>
+          <p:cNvSpPr txBox="1"/>
+          <p:nvPr/>
+        </p:nvSpPr>
+        <p:spPr>
+          <a:xfrm>
+            <a:off x="-677011" y="105864"/>
+            <a:ext cx="3328272" cy="769441"/>
+          </a:xfrm>
+          <a:prstGeom prst="rect">
+            <a:avLst/>
+          </a:prstGeom>
+          <a:noFill/>
+          <a:ln>
+            <a:noFill/>
+          </a:ln>
+        </p:spPr>
+        <p:txBody>
+          <a:bodyPr wrap="square" lIns="91440" tIns="45720" rIns="91440" bIns="45720" rtlCol="0" anchor="t">
+            <a:spAutoFit/>
+          </a:bodyPr>
+          <a:lstStyle/>
+          <a:p>
+            <a:pPr algn="ctr"/>
+            <a:r>
+              <a:rPr lang="pt-BR" sz="4400" dirty="0">
+                <a:solidFill>
+                  <a:srgbClr val="8403E8"/>
+                </a:solidFill>
+                <a:latin typeface="Raleway"/>
+                <a:cs typeface="Quire Sans"/>
+              </a:rPr>
+              <a:t>OMNI</a:t>
+            </a:r>
+          </a:p>
+        </p:txBody>
+      </p:sp>
+    </p:spTree>
+    <p:extLst>
+      <p:ext uri="{BB962C8B-B14F-4D97-AF65-F5344CB8AC3E}">
+        <p14:creationId xmlns:p14="http://schemas.microsoft.com/office/powerpoint/2010/main" val="3610627457"/>
+      </p:ext>
+    </p:extLst>
+  </p:cSld>
+  <p:clrMapOvr>
+    <a:masterClrMapping/>
+  </p:clrMapOvr>
+  <mc:AlternateContent xmlns:mc="http://schemas.openxmlformats.org/markup-compatibility/2006">
+    <mc:Choice xmlns:p159="http://schemas.microsoft.com/office/powerpoint/2015/09/main" Requires="p159">
+      <p:transition xmlns:p14="http://schemas.microsoft.com/office/powerpoint/2010/main" spd="slow" p14:dur="2000">
+        <p159:morph option="byObject"/>
+      </p:transition>
+    </mc:Choice>
+    <mc:Fallback>
+      <p:transition spd="slow">
+        <p:fade/>
+      </p:transition>
+    </mc:Fallback>
+  </mc:AlternateContent>
+</p:sld>
+</file>
+
+<file path=ppt/slides/slide21.xml><?xml version="1.0" encoding="utf-8"?>
+<p:sld xmlns:a="http://schemas.openxmlformats.org/drawingml/2006/main" xmlns:r="http://schemas.openxmlformats.org/officeDocument/2006/relationships" xmlns:p="http://schemas.openxmlformats.org/presentationml/2006/main">
+  <p:cSld>
+    <p:spTree>
+      <p:nvGrpSpPr>
+        <p:cNvPr id="1" name=""/>
+        <p:cNvGrpSpPr/>
+        <p:nvPr/>
+      </p:nvGrpSpPr>
+      <p:grpSpPr>
+        <a:xfrm>
+          <a:off x="0" y="0"/>
+          <a:ext cx="0" cy="0"/>
+          <a:chOff x="0" y="0"/>
+          <a:chExt cx="0" cy="0"/>
+        </a:xfrm>
+      </p:grpSpPr>
+      <p:sp>
+        <p:nvSpPr>
+          <p:cNvPr id="9" name="TextBox 11">
+            <a:extLst>
+              <a:ext uri="{FF2B5EF4-FFF2-40B4-BE49-F238E27FC236}">
+                <a16:creationId xmlns:a16="http://schemas.microsoft.com/office/drawing/2014/main" id="{885A8FC7-3B65-D380-0FEA-DA33D6BF3F02}"/>
+              </a:ext>
+            </a:extLst>
+          </p:cNvPr>
+          <p:cNvSpPr txBox="1"/>
+          <p:nvPr/>
+        </p:nvSpPr>
+        <p:spPr>
+          <a:xfrm>
+            <a:off x="9336893" y="-601014"/>
+            <a:ext cx="2747266" cy="461665"/>
+          </a:xfrm>
+          <a:prstGeom prst="rect">
+            <a:avLst/>
+          </a:prstGeom>
+          <a:noFill/>
+        </p:spPr>
+        <p:txBody>
+          <a:bodyPr rot="0" spcFirstLastPara="0" vertOverflow="overflow" horzOverflow="overflow" vert="horz" wrap="square" lIns="91440" tIns="45720" rIns="91440" bIns="45720" numCol="1" spcCol="0" rtlCol="0" fromWordArt="0" anchor="t" anchorCtr="0" forceAA="0" compatLnSpc="1">
+            <a:prstTxWarp prst="textNoShape">
+              <a:avLst/>
+            </a:prstTxWarp>
+            <a:spAutoFit/>
+          </a:bodyPr>
+          <a:lstStyle/>
+          <a:p>
+            <a:pPr algn="l"/>
+            <a:r>
+              <a:rPr lang="en-US" sz="2400" dirty="0" err="1">
+                <a:solidFill>
+                  <a:srgbClr val="7030A0"/>
+                </a:solidFill>
+                <a:latin typeface="Raleway" pitchFamily="2" charset="0"/>
+                <a:cs typeface="Calibri"/>
+              </a:rPr>
+              <a:t>desenvolvimento</a:t>
+            </a:r>
+            <a:endParaRPr lang="en-US" sz="2400" dirty="0">
+              <a:solidFill>
+                <a:srgbClr val="7030A0"/>
+              </a:solidFill>
+              <a:latin typeface="Raleway" pitchFamily="2" charset="0"/>
+              <a:cs typeface="Calibri"/>
+            </a:endParaRPr>
+          </a:p>
+        </p:txBody>
+      </p:sp>
+      <p:sp>
+        <p:nvSpPr>
+          <p:cNvPr id="10" name="Elipse 9">
+            <a:extLst>
+              <a:ext uri="{FF2B5EF4-FFF2-40B4-BE49-F238E27FC236}">
+                <a16:creationId xmlns:a16="http://schemas.microsoft.com/office/drawing/2014/main" id="{54C59E0B-9841-C2C1-E264-279317C2B7C7}"/>
+              </a:ext>
+            </a:extLst>
+          </p:cNvPr>
+          <p:cNvSpPr/>
+          <p:nvPr/>
+        </p:nvSpPr>
+        <p:spPr>
+          <a:xfrm>
+            <a:off x="8742302" y="-627911"/>
+            <a:ext cx="515461" cy="515461"/>
+          </a:xfrm>
+          <a:prstGeom prst="ellipse">
+            <a:avLst/>
+          </a:prstGeom>
+          <a:solidFill>
+            <a:srgbClr val="8403E8"/>
+          </a:solidFill>
+          <a:ln>
+            <a:noFill/>
+          </a:ln>
+        </p:spPr>
+        <p:style>
+          <a:lnRef idx="2">
+            <a:schemeClr val="accent1">
+              <a:shade val="50000"/>
+            </a:schemeClr>
+          </a:lnRef>
+          <a:fillRef idx="1">
+            <a:schemeClr val="accent1"/>
+          </a:fillRef>
+          <a:effectRef idx="0">
+            <a:schemeClr val="accent1"/>
+          </a:effectRef>
+          <a:fontRef idx="minor">
+            <a:schemeClr val="lt1"/>
+          </a:fontRef>
+        </p:style>
+        <p:txBody>
+          <a:bodyPr rtlCol="0" anchor="ctr"/>
+          <a:lstStyle/>
+          <a:p>
+            <a:pPr algn="ctr"/>
+            <a:endParaRPr lang="pt-BR"/>
+          </a:p>
+        </p:txBody>
+      </p:sp>
+      <p:pic>
+        <p:nvPicPr>
+          <p:cNvPr id="5" name="Imagem 4">
+            <a:extLst>
+              <a:ext uri="{FF2B5EF4-FFF2-40B4-BE49-F238E27FC236}">
+                <a16:creationId xmlns:a16="http://schemas.microsoft.com/office/drawing/2014/main" id="{ADA41DB6-CADE-15FE-410E-DB1956E8A2E3}"/>
+              </a:ext>
+            </a:extLst>
+          </p:cNvPr>
+          <p:cNvPicPr>
+            <a:picLocks noChangeAspect="1"/>
+          </p:cNvPicPr>
+          <p:nvPr/>
+        </p:nvPicPr>
+        <p:blipFill>
+          <a:blip r:embed="rId2"/>
+          <a:stretch>
+            <a:fillRect/>
+          </a:stretch>
+        </p:blipFill>
+        <p:spPr>
+          <a:xfrm>
+            <a:off x="-8696" y="0"/>
+            <a:ext cx="12209392" cy="6858000"/>
+          </a:xfrm>
+          <a:prstGeom prst="rect">
+            <a:avLst/>
+          </a:prstGeom>
+        </p:spPr>
+      </p:pic>
+    </p:spTree>
+    <p:extLst>
+      <p:ext uri="{BB962C8B-B14F-4D97-AF65-F5344CB8AC3E}">
+        <p14:creationId xmlns:p14="http://schemas.microsoft.com/office/powerpoint/2010/main" val="1463928419"/>
+      </p:ext>
+    </p:extLst>
+  </p:cSld>
+  <p:clrMapOvr>
+    <a:masterClrMapping/>
+  </p:clrMapOvr>
+  <mc:AlternateContent xmlns:mc="http://schemas.openxmlformats.org/markup-compatibility/2006">
+    <mc:Choice xmlns:p159="http://schemas.microsoft.com/office/powerpoint/2015/09/main" Requires="p159">
+      <p:transition xmlns:p14="http://schemas.microsoft.com/office/powerpoint/2010/main" spd="slow" p14:dur="2000">
+        <p159:morph option="byObject"/>
+      </p:transition>
+    </mc:Choice>
+    <mc:Fallback>
+      <p:transition spd="slow">
+        <p:fade/>
+      </p:transition>
+    </mc:Fallback>
+  </mc:AlternateContent>
+</p:sld>
+</file>
+
+<file path=ppt/slides/slide22.xml><?xml version="1.0" encoding="utf-8"?>
+<p:sld xmlns:a="http://schemas.openxmlformats.org/drawingml/2006/main" xmlns:r="http://schemas.openxmlformats.org/officeDocument/2006/relationships" xmlns:p="http://schemas.openxmlformats.org/presentationml/2006/main">
+  <p:cSld>
+    <p:spTree>
+      <p:nvGrpSpPr>
+        <p:cNvPr id="1" name=""/>
+        <p:cNvGrpSpPr/>
+        <p:nvPr/>
+      </p:nvGrpSpPr>
+      <p:grpSpPr>
+        <a:xfrm>
+          <a:off x="0" y="0"/>
+          <a:ext cx="0" cy="0"/>
+          <a:chOff x="0" y="0"/>
+          <a:chExt cx="0" cy="0"/>
+        </a:xfrm>
+      </p:grpSpPr>
+      <p:sp>
+        <p:nvSpPr>
+          <p:cNvPr id="11" name="background">
+            <a:extLst>
+              <a:ext uri="{FF2B5EF4-FFF2-40B4-BE49-F238E27FC236}">
+                <a16:creationId xmlns:a16="http://schemas.microsoft.com/office/drawing/2014/main" id="{4EEF6E71-2AFD-3F6F-9046-EE4B2D4D8787}"/>
+              </a:ext>
+            </a:extLst>
+          </p:cNvPr>
+          <p:cNvSpPr>
+            <a:spLocks noGrp="1" noRot="1" noMove="1" noResize="1" noEditPoints="1" noAdjustHandles="1" noChangeArrowheads="1" noChangeShapeType="1"/>
+          </p:cNvSpPr>
+          <p:nvPr/>
+        </p:nvSpPr>
+        <p:spPr>
+          <a:xfrm>
+            <a:off x="1" y="0"/>
+            <a:ext cx="12192000" cy="6858000"/>
+          </a:xfrm>
+          <a:prstGeom prst="rect">
+            <a:avLst/>
+          </a:prstGeom>
+          <a:solidFill>
+            <a:srgbClr val="FDFBFF"/>
+          </a:solidFill>
+        </p:spPr>
+        <p:style>
+          <a:lnRef idx="2">
+            <a:schemeClr val="accent1">
+              <a:shade val="50000"/>
+            </a:schemeClr>
+          </a:lnRef>
+          <a:fillRef idx="1">
+            <a:schemeClr val="accent1"/>
+          </a:fillRef>
+          <a:effectRef idx="0">
+            <a:schemeClr val="accent1"/>
+          </a:effectRef>
+          <a:fontRef idx="minor">
+            <a:schemeClr val="lt1"/>
+          </a:fontRef>
+        </p:style>
+        <p:txBody>
+          <a:bodyPr rtlCol="0" anchor="ctr"/>
+          <a:lstStyle/>
+          <a:p>
+            <a:pPr algn="ctr"/>
+            <a:endParaRPr lang="pt-BR" sz="1355" dirty="0">
+              <a:latin typeface="Quicksand" panose="00000500000000000000" pitchFamily="2" charset="0"/>
+            </a:endParaRPr>
+          </a:p>
+        </p:txBody>
+      </p:sp>
+      <p:sp>
+        <p:nvSpPr>
+          <p:cNvPr id="9" name="TextBox 11">
+            <a:extLst>
+              <a:ext uri="{FF2B5EF4-FFF2-40B4-BE49-F238E27FC236}">
+                <a16:creationId xmlns:a16="http://schemas.microsoft.com/office/drawing/2014/main" id="{885A8FC7-3B65-D380-0FEA-DA33D6BF3F02}"/>
+              </a:ext>
+            </a:extLst>
+          </p:cNvPr>
+          <p:cNvSpPr txBox="1"/>
+          <p:nvPr/>
+        </p:nvSpPr>
+        <p:spPr>
+          <a:xfrm>
+            <a:off x="9336893" y="-601014"/>
+            <a:ext cx="2747266" cy="461665"/>
+          </a:xfrm>
+          <a:prstGeom prst="rect">
+            <a:avLst/>
+          </a:prstGeom>
+          <a:noFill/>
+        </p:spPr>
+        <p:txBody>
+          <a:bodyPr rot="0" spcFirstLastPara="0" vertOverflow="overflow" horzOverflow="overflow" vert="horz" wrap="square" lIns="91440" tIns="45720" rIns="91440" bIns="45720" numCol="1" spcCol="0" rtlCol="0" fromWordArt="0" anchor="t" anchorCtr="0" forceAA="0" compatLnSpc="1">
+            <a:prstTxWarp prst="textNoShape">
+              <a:avLst/>
+            </a:prstTxWarp>
+            <a:spAutoFit/>
+          </a:bodyPr>
+          <a:lstStyle/>
+          <a:p>
+            <a:pPr algn="l"/>
+            <a:r>
+              <a:rPr lang="en-US" sz="2400" dirty="0" err="1">
+                <a:solidFill>
+                  <a:srgbClr val="7030A0"/>
+                </a:solidFill>
+                <a:latin typeface="Raleway" pitchFamily="2" charset="0"/>
+                <a:cs typeface="Calibri"/>
+              </a:rPr>
+              <a:t>desenvolvimento</a:t>
+            </a:r>
+            <a:endParaRPr lang="en-US" sz="2400" dirty="0">
+              <a:solidFill>
+                <a:srgbClr val="7030A0"/>
+              </a:solidFill>
+              <a:latin typeface="Raleway" pitchFamily="2" charset="0"/>
+              <a:cs typeface="Calibri"/>
+            </a:endParaRPr>
+          </a:p>
+        </p:txBody>
+      </p:sp>
+      <p:sp>
+        <p:nvSpPr>
+          <p:cNvPr id="10" name="Elipse 9">
+            <a:extLst>
+              <a:ext uri="{FF2B5EF4-FFF2-40B4-BE49-F238E27FC236}">
+                <a16:creationId xmlns:a16="http://schemas.microsoft.com/office/drawing/2014/main" id="{54C59E0B-9841-C2C1-E264-279317C2B7C7}"/>
+              </a:ext>
+            </a:extLst>
+          </p:cNvPr>
+          <p:cNvSpPr/>
+          <p:nvPr/>
+        </p:nvSpPr>
+        <p:spPr>
+          <a:xfrm>
+            <a:off x="8742302" y="-627911"/>
+            <a:ext cx="515461" cy="515461"/>
+          </a:xfrm>
+          <a:prstGeom prst="ellipse">
+            <a:avLst/>
+          </a:prstGeom>
+          <a:solidFill>
+            <a:srgbClr val="8403E8"/>
+          </a:solidFill>
+          <a:ln>
+            <a:noFill/>
+          </a:ln>
+        </p:spPr>
+        <p:style>
+          <a:lnRef idx="2">
+            <a:schemeClr val="accent1">
+              <a:shade val="50000"/>
+            </a:schemeClr>
+          </a:lnRef>
+          <a:fillRef idx="1">
+            <a:schemeClr val="accent1"/>
+          </a:fillRef>
+          <a:effectRef idx="0">
+            <a:schemeClr val="accent1"/>
+          </a:effectRef>
+          <a:fontRef idx="minor">
+            <a:schemeClr val="lt1"/>
+          </a:fontRef>
+        </p:style>
+        <p:txBody>
+          <a:bodyPr rtlCol="0" anchor="ctr"/>
+          <a:lstStyle/>
+          <a:p>
+            <a:pPr algn="ctr"/>
+            <a:endParaRPr lang="pt-BR"/>
+          </a:p>
+        </p:txBody>
+      </p:sp>
+      <p:pic>
+        <p:nvPicPr>
+          <p:cNvPr id="5" name="Imagem 4">
+            <a:extLst>
+              <a:ext uri="{FF2B5EF4-FFF2-40B4-BE49-F238E27FC236}">
+                <a16:creationId xmlns:a16="http://schemas.microsoft.com/office/drawing/2014/main" id="{ADA41DB6-CADE-15FE-410E-DB1956E8A2E3}"/>
+              </a:ext>
+            </a:extLst>
+          </p:cNvPr>
+          <p:cNvPicPr>
+            <a:picLocks noChangeAspect="1"/>
+          </p:cNvPicPr>
+          <p:nvPr/>
+        </p:nvPicPr>
+        <p:blipFill rotWithShape="1">
+          <a:blip r:embed="rId2"/>
+          <a:srcRect l="4286" t="7925" r="75534" b="5330"/>
+          <a:stretch/>
+        </p:blipFill>
+        <p:spPr>
+          <a:xfrm>
+            <a:off x="4419600" y="566057"/>
+            <a:ext cx="2463800" cy="5949043"/>
+          </a:xfrm>
+          <a:prstGeom prst="rect">
+            <a:avLst/>
+          </a:prstGeom>
+        </p:spPr>
+      </p:pic>
+      <p:pic>
+        <p:nvPicPr>
+          <p:cNvPr id="6" name="!!img">
+            <a:extLst>
+              <a:ext uri="{FF2B5EF4-FFF2-40B4-BE49-F238E27FC236}">
+                <a16:creationId xmlns:a16="http://schemas.microsoft.com/office/drawing/2014/main" id="{FDE36430-33AF-BF5F-DAB3-15F1DFFA2374}"/>
+              </a:ext>
+            </a:extLst>
+          </p:cNvPr>
+          <p:cNvPicPr>
+            <a:picLocks noChangeAspect="1"/>
+          </p:cNvPicPr>
+          <p:nvPr/>
+        </p:nvPicPr>
+        <p:blipFill>
+          <a:blip r:embed="rId3">
+            <a:alphaModFix amt="20000"/>
+            <a:extLst>
+              <a:ext uri="{28A0092B-C50C-407E-A947-70E740481C1C}">
+                <a14:useLocalDpi xmlns:a14="http://schemas.microsoft.com/office/drawing/2010/main" val="0"/>
+              </a:ext>
+            </a:extLst>
+          </a:blip>
+          <a:srcRect/>
+          <a:stretch/>
+        </p:blipFill>
+        <p:spPr>
+          <a:xfrm rot="21329866">
+            <a:off x="-3032327" y="3934899"/>
+            <a:ext cx="7302127" cy="6980654"/>
+          </a:xfrm>
+          <a:prstGeom prst="rect">
+            <a:avLst/>
+          </a:prstGeom>
+        </p:spPr>
+      </p:pic>
+      <p:sp>
+        <p:nvSpPr>
+          <p:cNvPr id="7" name="CaixaDeTexto 6">
+            <a:extLst>
+              <a:ext uri="{FF2B5EF4-FFF2-40B4-BE49-F238E27FC236}">
+                <a16:creationId xmlns:a16="http://schemas.microsoft.com/office/drawing/2014/main" id="{3C00BADE-E333-63BD-5C6E-94D9D7F0EF01}"/>
+              </a:ext>
+            </a:extLst>
+          </p:cNvPr>
+          <p:cNvSpPr txBox="1"/>
+          <p:nvPr/>
+        </p:nvSpPr>
+        <p:spPr>
+          <a:xfrm>
+            <a:off x="7154844" y="6048609"/>
+            <a:ext cx="7759004" cy="769441"/>
+          </a:xfrm>
+          <a:prstGeom prst="rect">
+            <a:avLst/>
+          </a:prstGeom>
+          <a:noFill/>
+          <a:ln>
+            <a:noFill/>
+          </a:ln>
+        </p:spPr>
+        <p:txBody>
+          <a:bodyPr wrap="square" rtlCol="0">
+            <a:spAutoFit/>
+          </a:bodyPr>
+          <a:lstStyle/>
+          <a:p>
+            <a:pPr algn="ctr"/>
+            <a:r>
+              <a:rPr lang="pt-BR" sz="4400" dirty="0">
+                <a:ln>
+                  <a:solidFill>
+                    <a:srgbClr val="8403E8"/>
+                  </a:solidFill>
+                </a:ln>
+                <a:noFill/>
+                <a:latin typeface="Raleway" panose="020B0604020202020204" pitchFamily="2" charset="0"/>
+                <a:cs typeface="Quire Sans" panose="020B0502040204020203" pitchFamily="34" charset="0"/>
+              </a:rPr>
+              <a:t>TÊXTIL</a:t>
+            </a:r>
+          </a:p>
+        </p:txBody>
+      </p:sp>
+      <p:sp>
+        <p:nvSpPr>
+          <p:cNvPr id="8" name="CaixaDeTexto 7">
+            <a:extLst>
+              <a:ext uri="{FF2B5EF4-FFF2-40B4-BE49-F238E27FC236}">
+                <a16:creationId xmlns:a16="http://schemas.microsoft.com/office/drawing/2014/main" id="{0F487133-E52F-354F-D4FD-CC35BD6E7E19}"/>
+              </a:ext>
+            </a:extLst>
+          </p:cNvPr>
+          <p:cNvSpPr txBox="1"/>
+          <p:nvPr/>
+        </p:nvSpPr>
+        <p:spPr>
+          <a:xfrm>
+            <a:off x="-677011" y="105864"/>
+            <a:ext cx="3328272" cy="769441"/>
+          </a:xfrm>
+          <a:prstGeom prst="rect">
+            <a:avLst/>
+          </a:prstGeom>
+          <a:noFill/>
+          <a:ln>
+            <a:noFill/>
+          </a:ln>
+        </p:spPr>
+        <p:txBody>
+          <a:bodyPr wrap="square" lIns="91440" tIns="45720" rIns="91440" bIns="45720" rtlCol="0" anchor="t">
+            <a:spAutoFit/>
+          </a:bodyPr>
+          <a:lstStyle/>
+          <a:p>
+            <a:pPr algn="ctr"/>
+            <a:r>
+              <a:rPr lang="pt-BR" sz="4400" dirty="0">
+                <a:solidFill>
+                  <a:srgbClr val="8403E8"/>
+                </a:solidFill>
+                <a:latin typeface="Raleway"/>
+                <a:cs typeface="Quire Sans"/>
+              </a:rPr>
+              <a:t>OMNI</a:t>
+            </a:r>
+          </a:p>
+        </p:txBody>
+      </p:sp>
+    </p:spTree>
+    <p:extLst>
+      <p:ext uri="{BB962C8B-B14F-4D97-AF65-F5344CB8AC3E}">
+        <p14:creationId xmlns:p14="http://schemas.microsoft.com/office/powerpoint/2010/main" val="1059625345"/>
+      </p:ext>
+    </p:extLst>
+  </p:cSld>
+  <p:clrMapOvr>
+    <a:masterClrMapping/>
+  </p:clrMapOvr>
+  <mc:AlternateContent xmlns:mc="http://schemas.openxmlformats.org/markup-compatibility/2006">
+    <mc:Choice xmlns:p159="http://schemas.microsoft.com/office/powerpoint/2015/09/main" Requires="p159">
+      <p:transition xmlns:p14="http://schemas.microsoft.com/office/powerpoint/2010/main" spd="slow" p14:dur="2000">
+        <p159:morph option="byObject"/>
+      </p:transition>
+    </mc:Choice>
+    <mc:Fallback>
+      <p:transition spd="slow">
+        <p:fade/>
+      </p:transition>
+    </mc:Fallback>
+  </mc:AlternateContent>
+</p:sld>
+</file>
+
+<file path=ppt/slides/slide23.xml><?xml version="1.0" encoding="utf-8"?>
 <p:sld xmlns:a="http://schemas.openxmlformats.org/drawingml/2006/main" xmlns:r="http://schemas.openxmlformats.org/officeDocument/2006/relationships" xmlns:p="http://schemas.openxmlformats.org/presentationml/2006/main">
   <p:cSld>
     <p:spTree>
@@ -13232,346 +15593,6 @@
       </p:par>
     </p:tnLst>
   </p:timing>
-</p:sld>
-</file>
-
-<file path=ppt/slides/slide2.xml><?xml version="1.0" encoding="utf-8"?>
-<p:sld xmlns:a="http://schemas.openxmlformats.org/drawingml/2006/main" xmlns:r="http://schemas.openxmlformats.org/officeDocument/2006/relationships" xmlns:p="http://schemas.openxmlformats.org/presentationml/2006/main">
-  <p:cSld>
-    <p:spTree>
-      <p:nvGrpSpPr>
-        <p:cNvPr id="1" name=""/>
-        <p:cNvGrpSpPr/>
-        <p:nvPr/>
-      </p:nvGrpSpPr>
-      <p:grpSpPr>
-        <a:xfrm>
-          <a:off x="0" y="0"/>
-          <a:ext cx="0" cy="0"/>
-          <a:chOff x="0" y="0"/>
-          <a:chExt cx="0" cy="0"/>
-        </a:xfrm>
-      </p:grpSpPr>
-      <p:pic>
-        <p:nvPicPr>
-          <p:cNvPr id="5" name="Imagem 4" descr="Forma&#10;&#10;Descrição gerada automaticamente com confiança média">
-            <a:extLst>
-              <a:ext uri="{FF2B5EF4-FFF2-40B4-BE49-F238E27FC236}">
-                <a16:creationId xmlns:a16="http://schemas.microsoft.com/office/drawing/2014/main" id="{D9891E25-E261-DE6B-4C99-03057FD639EC}"/>
-              </a:ext>
-            </a:extLst>
-          </p:cNvPr>
-          <p:cNvPicPr>
-            <a:picLocks noChangeAspect="1"/>
-          </p:cNvPicPr>
-          <p:nvPr/>
-        </p:nvPicPr>
-        <p:blipFill>
-          <a:blip r:embed="rId2">
-            <a:extLst>
-              <a:ext uri="{28A0092B-C50C-407E-A947-70E740481C1C}">
-                <a14:useLocalDpi xmlns:a14="http://schemas.microsoft.com/office/drawing/2010/main" val="0"/>
-              </a:ext>
-            </a:extLst>
-          </a:blip>
-          <a:stretch>
-            <a:fillRect/>
-          </a:stretch>
-        </p:blipFill>
-        <p:spPr>
-          <a:xfrm rot="5820100">
-            <a:off x="2143286" y="1184101"/>
-            <a:ext cx="2299306" cy="2198079"/>
-          </a:xfrm>
-          <a:prstGeom prst="rect">
-            <a:avLst/>
-          </a:prstGeom>
-        </p:spPr>
-      </p:pic>
-      <p:sp>
-        <p:nvSpPr>
-          <p:cNvPr id="6" name="CaixaDeTexto 5">
-            <a:extLst>
-              <a:ext uri="{FF2B5EF4-FFF2-40B4-BE49-F238E27FC236}">
-                <a16:creationId xmlns:a16="http://schemas.microsoft.com/office/drawing/2014/main" id="{85371403-D354-8958-402C-293CC95B1D32}"/>
-              </a:ext>
-            </a:extLst>
-          </p:cNvPr>
-          <p:cNvSpPr txBox="1"/>
-          <p:nvPr/>
-        </p:nvSpPr>
-        <p:spPr>
-          <a:xfrm>
-            <a:off x="3765680" y="2283140"/>
-            <a:ext cx="5659643" cy="923330"/>
-          </a:xfrm>
-          <a:prstGeom prst="rect">
-            <a:avLst/>
-          </a:prstGeom>
-          <a:noFill/>
-          <a:ln>
-            <a:noFill/>
-          </a:ln>
-        </p:spPr>
-        <p:txBody>
-          <a:bodyPr wrap="square" rtlCol="0">
-            <a:spAutoFit/>
-          </a:bodyPr>
-          <a:lstStyle/>
-          <a:p>
-            <a:pPr algn="ctr"/>
-            <a:r>
-              <a:rPr lang="pt-BR" sz="5400" dirty="0">
-                <a:ln>
-                  <a:solidFill>
-                    <a:sysClr val="windowText" lastClr="000000"/>
-                  </a:solidFill>
-                </a:ln>
-                <a:noFill/>
-                <a:latin typeface="Raleway" panose="020B0604020202020204" pitchFamily="2" charset="0"/>
-                <a:cs typeface="Quire Sans" panose="020B0502040204020203" pitchFamily="34" charset="0"/>
-              </a:rPr>
-              <a:t>SOLUTIONS</a:t>
-            </a:r>
-          </a:p>
-        </p:txBody>
-      </p:sp>
-      <p:sp>
-        <p:nvSpPr>
-          <p:cNvPr id="4" name="CaixaDeTexto 3">
-            <a:extLst>
-              <a:ext uri="{FF2B5EF4-FFF2-40B4-BE49-F238E27FC236}">
-                <a16:creationId xmlns:a16="http://schemas.microsoft.com/office/drawing/2014/main" id="{C36ED40B-E864-1ECA-07DE-82704BDCC929}"/>
-              </a:ext>
-            </a:extLst>
-          </p:cNvPr>
-          <p:cNvSpPr txBox="1"/>
-          <p:nvPr/>
-        </p:nvSpPr>
-        <p:spPr>
-          <a:xfrm>
-            <a:off x="5381632" y="1469753"/>
-            <a:ext cx="2427738" cy="923330"/>
-          </a:xfrm>
-          <a:prstGeom prst="rect">
-            <a:avLst/>
-          </a:prstGeom>
-          <a:noFill/>
-          <a:ln>
-            <a:noFill/>
-          </a:ln>
-        </p:spPr>
-        <p:txBody>
-          <a:bodyPr wrap="square" rtlCol="0">
-            <a:spAutoFit/>
-          </a:bodyPr>
-          <a:lstStyle/>
-          <a:p>
-            <a:pPr algn="ctr"/>
-            <a:r>
-              <a:rPr lang="pt-BR" sz="5400" dirty="0">
-                <a:solidFill>
-                  <a:schemeClr val="tx1">
-                    <a:lumMod val="85000"/>
-                    <a:lumOff val="15000"/>
-                  </a:schemeClr>
-                </a:solidFill>
-                <a:latin typeface="Raleway" panose="020B0604020202020204" pitchFamily="2" charset="0"/>
-                <a:cs typeface="Quire Sans" panose="020B0502040204020203" pitchFamily="34" charset="0"/>
-              </a:rPr>
-              <a:t>OMNI</a:t>
-            </a:r>
-          </a:p>
-        </p:txBody>
-      </p:sp>
-      <p:sp>
-        <p:nvSpPr>
-          <p:cNvPr id="7" name="nomes1">
-            <a:extLst>
-              <a:ext uri="{FF2B5EF4-FFF2-40B4-BE49-F238E27FC236}">
-                <a16:creationId xmlns:a16="http://schemas.microsoft.com/office/drawing/2014/main" id="{FD5861A7-EBFF-89E2-F90E-12E5DBDFDB03}"/>
-              </a:ext>
-            </a:extLst>
-          </p:cNvPr>
-          <p:cNvSpPr txBox="1"/>
-          <p:nvPr/>
-        </p:nvSpPr>
-        <p:spPr>
-          <a:xfrm>
-            <a:off x="1400944" y="4430575"/>
-            <a:ext cx="3312000" cy="1620000"/>
-          </a:xfrm>
-          <a:prstGeom prst="rect">
-            <a:avLst/>
-          </a:prstGeom>
-          <a:noFill/>
-        </p:spPr>
-        <p:txBody>
-          <a:bodyPr wrap="square" rtlCol="0" anchor="ctr">
-            <a:spAutoFit/>
-          </a:bodyPr>
-          <a:lstStyle/>
-          <a:p>
-            <a:pPr marL="457200" indent="-457200">
-              <a:buFont typeface="Courier New" panose="02070309020205020404" pitchFamily="49" charset="0"/>
-              <a:buChar char="o"/>
-            </a:pPr>
-            <a:r>
-              <a:rPr lang="pt-BR" sz="2800" dirty="0">
-                <a:solidFill>
-                  <a:schemeClr val="tx1">
-                    <a:lumMod val="85000"/>
-                    <a:lumOff val="15000"/>
-                  </a:schemeClr>
-                </a:solidFill>
-                <a:latin typeface="Raleway" pitchFamily="2" charset="0"/>
-              </a:rPr>
-              <a:t>Eduarda Calixto</a:t>
-            </a:r>
-          </a:p>
-          <a:p>
-            <a:pPr marL="457200" indent="-457200">
-              <a:buFont typeface="Courier New" panose="02070309020205020404" pitchFamily="49" charset="0"/>
-              <a:buChar char="o"/>
-            </a:pPr>
-            <a:r>
-              <a:rPr lang="pt-BR" sz="2800" dirty="0">
-                <a:solidFill>
-                  <a:schemeClr val="tx1">
-                    <a:lumMod val="85000"/>
-                    <a:lumOff val="15000"/>
-                  </a:schemeClr>
-                </a:solidFill>
-                <a:latin typeface="Raleway" pitchFamily="2" charset="0"/>
-              </a:rPr>
-              <a:t>Fábio Ceslaki</a:t>
-            </a:r>
-          </a:p>
-          <a:p>
-            <a:pPr marL="457200" indent="-457200">
-              <a:buFont typeface="Courier New" panose="02070309020205020404" pitchFamily="49" charset="0"/>
-              <a:buChar char="o"/>
-            </a:pPr>
-            <a:r>
-              <a:rPr lang="pt-BR" sz="2800" dirty="0">
-                <a:solidFill>
-                  <a:schemeClr val="tx1">
-                    <a:lumMod val="85000"/>
-                    <a:lumOff val="15000"/>
-                  </a:schemeClr>
-                </a:solidFill>
-                <a:latin typeface="Raleway" pitchFamily="2" charset="0"/>
-              </a:rPr>
-              <a:t>Gabriel Martins </a:t>
-            </a:r>
-          </a:p>
-        </p:txBody>
-      </p:sp>
-      <p:sp>
-        <p:nvSpPr>
-          <p:cNvPr id="8" name="nomes2">
-            <a:extLst>
-              <a:ext uri="{FF2B5EF4-FFF2-40B4-BE49-F238E27FC236}">
-                <a16:creationId xmlns:a16="http://schemas.microsoft.com/office/drawing/2014/main" id="{369AD351-D921-3AE9-6DB6-FC90E1E40613}"/>
-              </a:ext>
-            </a:extLst>
-          </p:cNvPr>
-          <p:cNvSpPr txBox="1"/>
-          <p:nvPr/>
-        </p:nvSpPr>
-        <p:spPr>
-          <a:xfrm>
-            <a:off x="7602866" y="4430575"/>
-            <a:ext cx="3595222" cy="1384995"/>
-          </a:xfrm>
-          <a:prstGeom prst="rect">
-            <a:avLst/>
-          </a:prstGeom>
-          <a:noFill/>
-        </p:spPr>
-        <p:txBody>
-          <a:bodyPr wrap="square" rtlCol="0">
-            <a:spAutoFit/>
-          </a:bodyPr>
-          <a:lstStyle/>
-          <a:p>
-            <a:pPr marL="457200" indent="-457200">
-              <a:buFont typeface="Courier New" panose="02070309020205020404" pitchFamily="49" charset="0"/>
-              <a:buChar char="o"/>
-            </a:pPr>
-            <a:r>
-              <a:rPr lang="pt-BR" sz="2800" dirty="0">
-                <a:solidFill>
-                  <a:schemeClr val="tx1">
-                    <a:lumMod val="85000"/>
-                    <a:lumOff val="15000"/>
-                  </a:schemeClr>
-                </a:solidFill>
-                <a:latin typeface="Raleway" pitchFamily="2" charset="0"/>
-              </a:rPr>
-              <a:t>Thiago Ramos</a:t>
-            </a:r>
-          </a:p>
-          <a:p>
-            <a:pPr marL="457200" indent="-457200">
-              <a:buFont typeface="Courier New" panose="02070309020205020404" pitchFamily="49" charset="0"/>
-              <a:buChar char="o"/>
-            </a:pPr>
-            <a:r>
-              <a:rPr lang="pt-BR" sz="2800" dirty="0">
-                <a:solidFill>
-                  <a:schemeClr val="tx1">
-                    <a:lumMod val="85000"/>
-                    <a:lumOff val="15000"/>
-                  </a:schemeClr>
-                </a:solidFill>
-                <a:latin typeface="Raleway" pitchFamily="2" charset="0"/>
-              </a:rPr>
-              <a:t>Vitor Mendes</a:t>
-            </a:r>
-          </a:p>
-          <a:p>
-            <a:pPr marL="457200" indent="-457200">
-              <a:buFont typeface="Courier New" panose="02070309020205020404" pitchFamily="49" charset="0"/>
-              <a:buChar char="o"/>
-            </a:pPr>
-            <a:r>
-              <a:rPr lang="pt-BR" sz="2800" dirty="0">
-                <a:solidFill>
-                  <a:schemeClr val="tx1">
-                    <a:lumMod val="85000"/>
-                    <a:lumOff val="15000"/>
-                  </a:schemeClr>
-                </a:solidFill>
-                <a:latin typeface="Raleway" pitchFamily="2" charset="0"/>
-              </a:rPr>
-              <a:t>Wladimir Condori</a:t>
-            </a:r>
-          </a:p>
-        </p:txBody>
-      </p:sp>
-    </p:spTree>
-    <p:extLst>
-      <p:ext uri="{BB962C8B-B14F-4D97-AF65-F5344CB8AC3E}">
-        <p14:creationId xmlns:p14="http://schemas.microsoft.com/office/powerpoint/2010/main" val="179938745"/>
-      </p:ext>
-    </p:extLst>
-  </p:cSld>
-  <p:clrMapOvr>
-    <a:masterClrMapping/>
-  </p:clrMapOvr>
-  <mc:AlternateContent xmlns:mc="http://schemas.openxmlformats.org/markup-compatibility/2006" xmlns:p159="http://schemas.microsoft.com/office/powerpoint/2015/09/main">
-    <mc:Choice Requires="p159">
-      <p:transition xmlns:p14="http://schemas.microsoft.com/office/powerpoint/2010/main" spd="slow" p14:dur="2000">
-        <p159:morph option="byObject"/>
-      </p:transition>
-    </mc:Choice>
-    <mc:Fallback xmlns="">
-      <p:transition spd="slow">
-        <p:fade/>
-      </p:transition>
-    </mc:Fallback>
-  </mc:AlternateContent>
 </p:sld>
 </file>
 
@@ -20452,12 +22473,6 @@
 </file>
 
 <file path=customXml/item1.xml><?xml version="1.0" encoding="utf-8"?>
-<p:properties xmlns:p="http://schemas.microsoft.com/office/2006/metadata/properties" xmlns:xsi="http://www.w3.org/2001/XMLSchema-instance" xmlns:pc="http://schemas.microsoft.com/office/infopath/2007/PartnerControls">
-  <documentManagement/>
-</p:properties>
-</file>
-
-<file path=customXml/item2.xml><?xml version="1.0" encoding="utf-8"?>
 <ct:contentTypeSchema xmlns:ct="http://schemas.microsoft.com/office/2006/metadata/contentType" xmlns:ma="http://schemas.microsoft.com/office/2006/metadata/properties/metaAttributes" ct:_="" ma:_="" ma:contentTypeName="Document" ma:contentTypeID="0x010100CD94351161D70F4CAEBD7B86231B3DDF" ma:contentTypeVersion="4" ma:contentTypeDescription="Create a new document." ma:contentTypeScope="" ma:versionID="5cc1431f9783d4f5e516e1e6dd293d6e">
   <xsd:schema xmlns:xsd="http://www.w3.org/2001/XMLSchema" xmlns:xs="http://www.w3.org/2001/XMLSchema" xmlns:p="http://schemas.microsoft.com/office/2006/metadata/properties" xmlns:ns3="4bc5c97c-1d73-4ddd-b761-3e2b250dfd29" targetNamespace="http://schemas.microsoft.com/office/2006/metadata/properties" ma:root="true" ma:fieldsID="81d426787a2ad5e2b6fa71d4453f615a" ns3:_="">
     <xsd:import namespace="4bc5c97c-1d73-4ddd-b761-3e2b250dfd29"/>
@@ -20603,6 +22618,12 @@
 </ct:contentTypeSchema>
 </file>
 
+<file path=customXml/item2.xml><?xml version="1.0" encoding="utf-8"?>
+<p:properties xmlns:p="http://schemas.microsoft.com/office/2006/metadata/properties" xmlns:xsi="http://www.w3.org/2001/XMLSchema-instance" xmlns:pc="http://schemas.microsoft.com/office/infopath/2007/PartnerControls">
+  <documentManagement/>
+</p:properties>
+</file>
+
 <file path=customXml/item3.xml><?xml version="1.0" encoding="utf-8"?>
 <?mso-contentType ?>
 <FormTemplates xmlns="http://schemas.microsoft.com/sharepoint/v3/contenttype/forms">
@@ -20613,22 +22634,6 @@
 </file>
 
 <file path=customXml/itemProps1.xml><?xml version="1.0" encoding="utf-8"?>
-<ds:datastoreItem xmlns:ds="http://schemas.openxmlformats.org/officeDocument/2006/customXml" ds:itemID="{D0CF3473-0CF4-4370-879D-E6441508A2E5}">
-  <ds:schemaRefs>
-    <ds:schemaRef ds:uri="4bc5c97c-1d73-4ddd-b761-3e2b250dfd29"/>
-    <ds:schemaRef ds:uri="http://purl.org/dc/dcmitype/"/>
-    <ds:schemaRef ds:uri="http://schemas.microsoft.com/office/2006/documentManagement/types"/>
-    <ds:schemaRef ds:uri="http://schemas.openxmlformats.org/package/2006/metadata/core-properties"/>
-    <ds:schemaRef ds:uri="http://www.w3.org/XML/1998/namespace"/>
-    <ds:schemaRef ds:uri="http://purl.org/dc/elements/1.1/"/>
-    <ds:schemaRef ds:uri="http://schemas.microsoft.com/office/infopath/2007/PartnerControls"/>
-    <ds:schemaRef ds:uri="http://schemas.microsoft.com/office/2006/metadata/properties"/>
-    <ds:schemaRef ds:uri="http://purl.org/dc/terms/"/>
-  </ds:schemaRefs>
-</ds:datastoreItem>
-</file>
-
-<file path=customXml/itemProps2.xml><?xml version="1.0" encoding="utf-8"?>
 <ds:datastoreItem xmlns:ds="http://schemas.openxmlformats.org/officeDocument/2006/customXml" ds:itemID="{465069EE-6FD9-406D-8F8E-0381277CBFD4}">
   <ds:schemaRefs>
     <ds:schemaRef ds:uri="http://schemas.microsoft.com/office/2006/metadata/contentType"/>
@@ -20646,6 +22651,22 @@
 </ds:datastoreItem>
 </file>
 
+<file path=customXml/itemProps2.xml><?xml version="1.0" encoding="utf-8"?>
+<ds:datastoreItem xmlns:ds="http://schemas.openxmlformats.org/officeDocument/2006/customXml" ds:itemID="{D0CF3473-0CF4-4370-879D-E6441508A2E5}">
+  <ds:schemaRefs>
+    <ds:schemaRef ds:uri="4bc5c97c-1d73-4ddd-b761-3e2b250dfd29"/>
+    <ds:schemaRef ds:uri="http://purl.org/dc/dcmitype/"/>
+    <ds:schemaRef ds:uri="http://schemas.microsoft.com/office/2006/documentManagement/types"/>
+    <ds:schemaRef ds:uri="http://schemas.openxmlformats.org/package/2006/metadata/core-properties"/>
+    <ds:schemaRef ds:uri="http://www.w3.org/XML/1998/namespace"/>
+    <ds:schemaRef ds:uri="http://purl.org/dc/elements/1.1/"/>
+    <ds:schemaRef ds:uri="http://schemas.microsoft.com/office/infopath/2007/PartnerControls"/>
+    <ds:schemaRef ds:uri="http://schemas.microsoft.com/office/2006/metadata/properties"/>
+    <ds:schemaRef ds:uri="http://purl.org/dc/terms/"/>
+  </ds:schemaRefs>
+</ds:datastoreItem>
+</file>
+
 <file path=customXml/itemProps3.xml><?xml version="1.0" encoding="utf-8"?>
 <ds:datastoreItem xmlns:ds="http://schemas.openxmlformats.org/officeDocument/2006/customXml" ds:itemID="{94D73380-892F-4A54-AC50-91BE1A20A922}">
   <ds:schemaRefs>

</xml_diff>

<commit_message>
correção slide e doc
</commit_message>
<xml_diff>
--- a/APRESENTAÇÃO/Sprint 3/Slides.pptx
+++ b/APRESENTAÇÃO/Sprint 3/Slides.pptx
@@ -143,11 +143,11 @@
           <p14:sldIdLst>
             <p14:sldId id="258"/>
             <p14:sldId id="259"/>
+            <p14:sldId id="261"/>
           </p14:sldIdLst>
         </p14:section>
         <p14:section name="problema" id="{0022C630-33D3-4513-8B7A-970623C4C02C}">
           <p14:sldIdLst>
-            <p14:sldId id="261"/>
             <p14:sldId id="272"/>
           </p14:sldIdLst>
         </p14:section>
@@ -290,7 +290,7 @@
           </a:lstStyle>
           <a:p>
             <a:fld id="{76B1C3EF-B023-4125-AE71-5BE24305936C}" type="datetimeFigureOut">
-              <a:t>27/05/2022</a:t>
+              <a:t>29/05/2022</a:t>
             </a:fld>
             <a:endParaRPr lang="en-US"/>
           </a:p>
@@ -871,7 +871,7 @@
           <a:p>
             <a:fld id="{F956C699-4089-4636-A474-E7E35B76CA7C}" type="datetimeFigureOut">
               <a:rPr lang="pt-BR" smtClean="0"/>
-              <a:t>27/05/2022</a:t>
+              <a:t>29/05/2022</a:t>
             </a:fld>
             <a:endParaRPr lang="pt-BR"/>
           </a:p>
@@ -1069,7 +1069,7 @@
           <a:p>
             <a:fld id="{F956C699-4089-4636-A474-E7E35B76CA7C}" type="datetimeFigureOut">
               <a:rPr lang="pt-BR" smtClean="0"/>
-              <a:t>27/05/2022</a:t>
+              <a:t>29/05/2022</a:t>
             </a:fld>
             <a:endParaRPr lang="pt-BR"/>
           </a:p>
@@ -1277,7 +1277,7 @@
           <a:p>
             <a:fld id="{F956C699-4089-4636-A474-E7E35B76CA7C}" type="datetimeFigureOut">
               <a:rPr lang="pt-BR" smtClean="0"/>
-              <a:t>27/05/2022</a:t>
+              <a:t>29/05/2022</a:t>
             </a:fld>
             <a:endParaRPr lang="pt-BR"/>
           </a:p>
@@ -1481,7 +1481,7 @@
           <a:p>
             <a:fld id="{2FC3D184-0F2B-4D9D-BDB9-3409F15C70D5}" type="datetimeFigureOut">
               <a:rPr lang="pt-BR" smtClean="0"/>
-              <a:t>27/05/2022</a:t>
+              <a:t>29/05/2022</a:t>
             </a:fld>
             <a:endParaRPr lang="pt-BR" dirty="0"/>
           </a:p>
@@ -1651,7 +1651,7 @@
           <a:p>
             <a:fld id="{2FC3D184-0F2B-4D9D-BDB9-3409F15C70D5}" type="datetimeFigureOut">
               <a:rPr lang="pt-BR" smtClean="0"/>
-              <a:t>27/05/2022</a:t>
+              <a:t>29/05/2022</a:t>
             </a:fld>
             <a:endParaRPr lang="pt-BR" dirty="0"/>
           </a:p>
@@ -1897,7 +1897,7 @@
           <a:p>
             <a:fld id="{2FC3D184-0F2B-4D9D-BDB9-3409F15C70D5}" type="datetimeFigureOut">
               <a:rPr lang="pt-BR" smtClean="0"/>
-              <a:t>27/05/2022</a:t>
+              <a:t>29/05/2022</a:t>
             </a:fld>
             <a:endParaRPr lang="pt-BR" dirty="0"/>
           </a:p>
@@ -2129,7 +2129,7 @@
           <a:p>
             <a:fld id="{2FC3D184-0F2B-4D9D-BDB9-3409F15C70D5}" type="datetimeFigureOut">
               <a:rPr lang="pt-BR" smtClean="0"/>
-              <a:t>27/05/2022</a:t>
+              <a:t>29/05/2022</a:t>
             </a:fld>
             <a:endParaRPr lang="pt-BR" dirty="0"/>
           </a:p>
@@ -2496,7 +2496,7 @@
           <a:p>
             <a:fld id="{2FC3D184-0F2B-4D9D-BDB9-3409F15C70D5}" type="datetimeFigureOut">
               <a:rPr lang="pt-BR" smtClean="0"/>
-              <a:t>27/05/2022</a:t>
+              <a:t>29/05/2022</a:t>
             </a:fld>
             <a:endParaRPr lang="pt-BR" dirty="0"/>
           </a:p>
@@ -2614,7 +2614,7 @@
           <a:p>
             <a:fld id="{2FC3D184-0F2B-4D9D-BDB9-3409F15C70D5}" type="datetimeFigureOut">
               <a:rPr lang="pt-BR" smtClean="0"/>
-              <a:t>27/05/2022</a:t>
+              <a:t>29/05/2022</a:t>
             </a:fld>
             <a:endParaRPr lang="pt-BR" dirty="0"/>
           </a:p>
@@ -2709,7 +2709,7 @@
           <a:p>
             <a:fld id="{2FC3D184-0F2B-4D9D-BDB9-3409F15C70D5}" type="datetimeFigureOut">
               <a:rPr lang="pt-BR" smtClean="0"/>
-              <a:t>27/05/2022</a:t>
+              <a:t>29/05/2022</a:t>
             </a:fld>
             <a:endParaRPr lang="pt-BR" dirty="0"/>
           </a:p>
@@ -2986,7 +2986,7 @@
           <a:p>
             <a:fld id="{2FC3D184-0F2B-4D9D-BDB9-3409F15C70D5}" type="datetimeFigureOut">
               <a:rPr lang="pt-BR" smtClean="0"/>
-              <a:t>27/05/2022</a:t>
+              <a:t>29/05/2022</a:t>
             </a:fld>
             <a:endParaRPr lang="pt-BR" dirty="0"/>
           </a:p>
@@ -3172,7 +3172,7 @@
           <a:p>
             <a:fld id="{F956C699-4089-4636-A474-E7E35B76CA7C}" type="datetimeFigureOut">
               <a:rPr lang="pt-BR" smtClean="0"/>
-              <a:t>27/05/2022</a:t>
+              <a:t>29/05/2022</a:t>
             </a:fld>
             <a:endParaRPr lang="pt-BR"/>
           </a:p>
@@ -3441,7 +3441,7 @@
           <a:p>
             <a:fld id="{2FC3D184-0F2B-4D9D-BDB9-3409F15C70D5}" type="datetimeFigureOut">
               <a:rPr lang="pt-BR" smtClean="0"/>
-              <a:t>27/05/2022</a:t>
+              <a:t>29/05/2022</a:t>
             </a:fld>
             <a:endParaRPr lang="pt-BR" dirty="0"/>
           </a:p>
@@ -3611,7 +3611,7 @@
           <a:p>
             <a:fld id="{2FC3D184-0F2B-4D9D-BDB9-3409F15C70D5}" type="datetimeFigureOut">
               <a:rPr lang="pt-BR" smtClean="0"/>
-              <a:t>27/05/2022</a:t>
+              <a:t>29/05/2022</a:t>
             </a:fld>
             <a:endParaRPr lang="pt-BR" dirty="0"/>
           </a:p>
@@ -3791,7 +3791,7 @@
           <a:p>
             <a:fld id="{2FC3D184-0F2B-4D9D-BDB9-3409F15C70D5}" type="datetimeFigureOut">
               <a:rPr lang="pt-BR" smtClean="0"/>
-              <a:t>27/05/2022</a:t>
+              <a:t>29/05/2022</a:t>
             </a:fld>
             <a:endParaRPr lang="pt-BR" dirty="0"/>
           </a:p>
@@ -4054,7 +4054,7 @@
           <a:p>
             <a:fld id="{F956C699-4089-4636-A474-E7E35B76CA7C}" type="datetimeFigureOut">
               <a:rPr lang="pt-BR" smtClean="0"/>
-              <a:t>27/05/2022</a:t>
+              <a:t>29/05/2022</a:t>
             </a:fld>
             <a:endParaRPr lang="pt-BR"/>
           </a:p>
@@ -4319,7 +4319,7 @@
           <a:p>
             <a:fld id="{F956C699-4089-4636-A474-E7E35B76CA7C}" type="datetimeFigureOut">
               <a:rPr lang="pt-BR" smtClean="0"/>
-              <a:t>27/05/2022</a:t>
+              <a:t>29/05/2022</a:t>
             </a:fld>
             <a:endParaRPr lang="pt-BR"/>
           </a:p>
@@ -4731,7 +4731,7 @@
           <a:p>
             <a:fld id="{F956C699-4089-4636-A474-E7E35B76CA7C}" type="datetimeFigureOut">
               <a:rPr lang="pt-BR" smtClean="0"/>
-              <a:t>27/05/2022</a:t>
+              <a:t>29/05/2022</a:t>
             </a:fld>
             <a:endParaRPr lang="pt-BR"/>
           </a:p>
@@ -4872,7 +4872,7 @@
           <a:p>
             <a:fld id="{F956C699-4089-4636-A474-E7E35B76CA7C}" type="datetimeFigureOut">
               <a:rPr lang="pt-BR" smtClean="0"/>
-              <a:t>27/05/2022</a:t>
+              <a:t>29/05/2022</a:t>
             </a:fld>
             <a:endParaRPr lang="pt-BR"/>
           </a:p>
@@ -4985,7 +4985,7 @@
           <a:p>
             <a:fld id="{F956C699-4089-4636-A474-E7E35B76CA7C}" type="datetimeFigureOut">
               <a:rPr lang="pt-BR" smtClean="0"/>
-              <a:t>27/05/2022</a:t>
+              <a:t>29/05/2022</a:t>
             </a:fld>
             <a:endParaRPr lang="pt-BR"/>
           </a:p>
@@ -5296,7 +5296,7 @@
           <a:p>
             <a:fld id="{F956C699-4089-4636-A474-E7E35B76CA7C}" type="datetimeFigureOut">
               <a:rPr lang="pt-BR" smtClean="0"/>
-              <a:t>27/05/2022</a:t>
+              <a:t>29/05/2022</a:t>
             </a:fld>
             <a:endParaRPr lang="pt-BR"/>
           </a:p>
@@ -5584,7 +5584,7 @@
           <a:p>
             <a:fld id="{F956C699-4089-4636-A474-E7E35B76CA7C}" type="datetimeFigureOut">
               <a:rPr lang="pt-BR" smtClean="0"/>
-              <a:t>27/05/2022</a:t>
+              <a:t>29/05/2022</a:t>
             </a:fld>
             <a:endParaRPr lang="pt-BR"/>
           </a:p>
@@ -5825,7 +5825,7 @@
           <a:p>
             <a:fld id="{F956C699-4089-4636-A474-E7E35B76CA7C}" type="datetimeFigureOut">
               <a:rPr lang="pt-BR" smtClean="0"/>
-              <a:t>27/05/2022</a:t>
+              <a:t>29/05/2022</a:t>
             </a:fld>
             <a:endParaRPr lang="pt-BR"/>
           </a:p>
@@ -6377,7 +6377,7 @@
           <a:p>
             <a:fld id="{2FC3D184-0F2B-4D9D-BDB9-3409F15C70D5}" type="datetimeFigureOut">
               <a:rPr lang="pt-BR" smtClean="0"/>
-              <a:t>27/05/2022</a:t>
+              <a:t>29/05/2022</a:t>
             </a:fld>
             <a:endParaRPr lang="pt-BR" dirty="0"/>
           </a:p>
@@ -7128,10 +7128,10 @@
       </p:sp>
       <p:pic>
         <p:nvPicPr>
-          <p:cNvPr id="10" name="Imagem 9">
-            <a:extLst>
-              <a:ext uri="{FF2B5EF4-FFF2-40B4-BE49-F238E27FC236}">
-                <a16:creationId xmlns:a16="http://schemas.microsoft.com/office/drawing/2014/main" id="{A6C36CCB-EFB2-3C81-06FE-73A8A777DFF2}"/>
+          <p:cNvPr id="6" name="Imagem 5">
+            <a:extLst>
+              <a:ext uri="{FF2B5EF4-FFF2-40B4-BE49-F238E27FC236}">
+                <a16:creationId xmlns:a16="http://schemas.microsoft.com/office/drawing/2014/main" id="{DFA8682B-DBB9-BCDD-766E-A61ED30BE0DC}"/>
               </a:ext>
             </a:extLst>
           </p:cNvPr>
@@ -7148,8 +7148,8 @@
         </p:blipFill>
         <p:spPr>
           <a:xfrm>
-            <a:off x="1773034" y="1981200"/>
-            <a:ext cx="5886450" cy="4876800"/>
+            <a:off x="1864082" y="2608131"/>
+            <a:ext cx="5963482" cy="3801005"/>
           </a:xfrm>
           <a:prstGeom prst="rect">
             <a:avLst/>
@@ -7524,7 +7524,7 @@
                                           </p:stCondLst>
                                         </p:cTn>
                                         <p:tgtEl>
-                                          <p:spTgt spid="10"/>
+                                          <p:spTgt spid="6"/>
                                         </p:tgtEl>
                                         <p:attrNameLst>
                                           <p:attrName>style.visibility</p:attrName>
@@ -7538,7 +7538,7 @@
                                       <p:cBhvr>
                                         <p:cTn id="11" dur="500"/>
                                         <p:tgtEl>
-                                          <p:spTgt spid="10"/>
+                                          <p:spTgt spid="6"/>
                                         </p:tgtEl>
                                       </p:cBhvr>
                                     </p:animEffect>
@@ -8262,7 +8262,7 @@
         <p:spPr>
           <a:xfrm>
             <a:off x="6990734" y="594657"/>
-            <a:ext cx="1512234" cy="509178"/>
+            <a:ext cx="1512234" cy="370230"/>
           </a:xfrm>
           <a:prstGeom prst="rect">
             <a:avLst/>
@@ -8300,7 +8300,7 @@
                 </a:solidFill>
                 <a:latin typeface="Quicksand" panose="00000500000000000000" pitchFamily="2" charset="0"/>
               </a:rPr>
-              <a:t>Microsoft MYSQL Server</a:t>
+              <a:t>Microsoft SQL Server</a:t>
             </a:r>
           </a:p>
         </p:txBody>
@@ -12985,13 +12985,13 @@
   <p:clrMapOvr>
     <a:masterClrMapping/>
   </p:clrMapOvr>
-  <mc:AlternateContent xmlns:mc="http://schemas.openxmlformats.org/markup-compatibility/2006">
-    <mc:Choice xmlns:p159="http://schemas.microsoft.com/office/powerpoint/2015/09/main" Requires="p159">
+  <mc:AlternateContent xmlns:mc="http://schemas.openxmlformats.org/markup-compatibility/2006" xmlns:p159="http://schemas.microsoft.com/office/powerpoint/2015/09/main">
+    <mc:Choice Requires="p159">
       <p:transition xmlns:p14="http://schemas.microsoft.com/office/powerpoint/2010/main" spd="slow" p14:dur="2000">
         <p159:morph option="byObject"/>
       </p:transition>
     </mc:Choice>
-    <mc:Fallback>
+    <mc:Fallback xmlns="">
       <p:transition spd="slow">
         <p:fade/>
       </p:transition>
@@ -13344,13 +13344,13 @@
   <p:clrMapOvr>
     <a:masterClrMapping/>
   </p:clrMapOvr>
-  <mc:AlternateContent xmlns:mc="http://schemas.openxmlformats.org/markup-compatibility/2006">
-    <mc:Choice xmlns:p159="http://schemas.microsoft.com/office/powerpoint/2015/09/main" Requires="p159">
+  <mc:AlternateContent xmlns:mc="http://schemas.openxmlformats.org/markup-compatibility/2006" xmlns:p159="http://schemas.microsoft.com/office/powerpoint/2015/09/main">
+    <mc:Choice Requires="p159">
       <p:transition xmlns:p14="http://schemas.microsoft.com/office/powerpoint/2010/main" spd="slow" p14:dur="2000">
         <p159:morph option="byObject"/>
       </p:transition>
     </mc:Choice>
-    <mc:Fallback>
+    <mc:Fallback xmlns="">
       <p:transition spd="slow">
         <p:fade/>
       </p:transition>
@@ -13520,13 +13520,13 @@
   <p:clrMapOvr>
     <a:masterClrMapping/>
   </p:clrMapOvr>
-  <mc:AlternateContent xmlns:mc="http://schemas.openxmlformats.org/markup-compatibility/2006">
-    <mc:Choice xmlns:p159="http://schemas.microsoft.com/office/powerpoint/2015/09/main" Requires="p159">
+  <mc:AlternateContent xmlns:mc="http://schemas.openxmlformats.org/markup-compatibility/2006" xmlns:p159="http://schemas.microsoft.com/office/powerpoint/2015/09/main">
+    <mc:Choice Requires="p159">
       <p:transition xmlns:p14="http://schemas.microsoft.com/office/powerpoint/2010/main" spd="slow" p14:dur="2000">
         <p159:morph option="byObject"/>
       </p:transition>
     </mc:Choice>
-    <mc:Fallback>
+    <mc:Fallback xmlns="">
       <p:transition spd="slow">
         <p:fade/>
       </p:transition>
@@ -14217,13 +14217,13 @@
   <p:clrMapOvr>
     <a:masterClrMapping/>
   </p:clrMapOvr>
-  <mc:AlternateContent xmlns:mc="http://schemas.openxmlformats.org/markup-compatibility/2006">
-    <mc:Choice xmlns:p159="http://schemas.microsoft.com/office/powerpoint/2015/09/main" Requires="p159">
+  <mc:AlternateContent xmlns:mc="http://schemas.openxmlformats.org/markup-compatibility/2006" xmlns:p159="http://schemas.microsoft.com/office/powerpoint/2015/09/main">
+    <mc:Choice Requires="p159">
       <p:transition xmlns:p14="http://schemas.microsoft.com/office/powerpoint/2010/main" spd="slow" p14:dur="2000">
         <p159:morph option="byObject"/>
       </p:transition>
     </mc:Choice>
-    <mc:Fallback>
+    <mc:Fallback xmlns="">
       <p:transition spd="slow">
         <p:fade/>
       </p:transition>
@@ -14393,13 +14393,13 @@
   <p:clrMapOvr>
     <a:masterClrMapping/>
   </p:clrMapOvr>
-  <mc:AlternateContent xmlns:mc="http://schemas.openxmlformats.org/markup-compatibility/2006">
-    <mc:Choice xmlns:p159="http://schemas.microsoft.com/office/powerpoint/2015/09/main" Requires="p159">
+  <mc:AlternateContent xmlns:mc="http://schemas.openxmlformats.org/markup-compatibility/2006" xmlns:p159="http://schemas.microsoft.com/office/powerpoint/2015/09/main">
+    <mc:Choice Requires="p159">
       <p:transition xmlns:p14="http://schemas.microsoft.com/office/powerpoint/2010/main" spd="slow" p14:dur="2000">
         <p159:morph option="byObject"/>
       </p:transition>
     </mc:Choice>
-    <mc:Fallback>
+    <mc:Fallback xmlns="">
       <p:transition spd="slow">
         <p:fade/>
       </p:transition>
@@ -14750,13 +14750,13 @@
   <p:clrMapOvr>
     <a:masterClrMapping/>
   </p:clrMapOvr>
-  <mc:AlternateContent xmlns:mc="http://schemas.openxmlformats.org/markup-compatibility/2006">
-    <mc:Choice xmlns:p159="http://schemas.microsoft.com/office/powerpoint/2015/09/main" Requires="p159">
+  <mc:AlternateContent xmlns:mc="http://schemas.openxmlformats.org/markup-compatibility/2006" xmlns:p159="http://schemas.microsoft.com/office/powerpoint/2015/09/main">
+    <mc:Choice Requires="p159">
       <p:transition xmlns:p14="http://schemas.microsoft.com/office/powerpoint/2010/main" spd="slow" p14:dur="2000">
         <p159:morph option="byObject"/>
       </p:transition>
     </mc:Choice>
-    <mc:Fallback>
+    <mc:Fallback xmlns="">
       <p:transition spd="slow">
         <p:fade/>
       </p:transition>
@@ -16957,10 +16957,61 @@
       </p:cxnSp>
       <p:sp>
         <p:nvSpPr>
-          <p:cNvPr id="46" name="bolinhaProblema">
-            <a:extLst>
-              <a:ext uri="{FF2B5EF4-FFF2-40B4-BE49-F238E27FC236}">
-                <a16:creationId xmlns:a16="http://schemas.microsoft.com/office/drawing/2014/main" id="{8EFD9642-3DA0-65C9-11E8-AA4FE466B750}"/>
+          <p:cNvPr id="18" name="TextBox 11">
+            <a:extLst>
+              <a:ext uri="{FF2B5EF4-FFF2-40B4-BE49-F238E27FC236}">
+                <a16:creationId xmlns:a16="http://schemas.microsoft.com/office/drawing/2014/main" id="{60FBAA70-11E0-9E0F-4E9B-358BDC34F669}"/>
+              </a:ext>
+            </a:extLst>
+          </p:cNvPr>
+          <p:cNvSpPr txBox="1"/>
+          <p:nvPr/>
+        </p:nvSpPr>
+        <p:spPr>
+          <a:xfrm>
+            <a:off x="10496613" y="386743"/>
+            <a:ext cx="1587097" cy="461665"/>
+          </a:xfrm>
+          <a:prstGeom prst="rect">
+            <a:avLst/>
+          </a:prstGeom>
+          <a:noFill/>
+        </p:spPr>
+        <p:txBody>
+          <a:bodyPr rot="0" spcFirstLastPara="0" vertOverflow="overflow" horzOverflow="overflow" vert="horz" wrap="square" lIns="91440" tIns="45720" rIns="91440" bIns="45720" numCol="1" spcCol="0" rtlCol="0" fromWordArt="0" anchor="t" anchorCtr="0" forceAA="0" compatLnSpc="1">
+            <a:prstTxWarp prst="textNoShape">
+              <a:avLst/>
+            </a:prstTxWarp>
+            <a:spAutoFit/>
+          </a:bodyPr>
+          <a:lstStyle/>
+          <a:p>
+            <a:pPr algn="l"/>
+            <a:r>
+              <a:rPr lang="en-US" sz="2400" dirty="0">
+                <a:solidFill>
+                  <a:srgbClr val="7030A0"/>
+                </a:solidFill>
+                <a:latin typeface="Raleway"/>
+                <a:cs typeface="Calibri"/>
+              </a:rPr>
+              <a:t>contexto</a:t>
+            </a:r>
+            <a:endParaRPr lang="en-US" sz="2400" dirty="0">
+              <a:solidFill>
+                <a:srgbClr val="7030A0"/>
+              </a:solidFill>
+              <a:cs typeface="Calibri"/>
+            </a:endParaRPr>
+          </a:p>
+        </p:txBody>
+      </p:sp>
+      <p:sp>
+        <p:nvSpPr>
+          <p:cNvPr id="19" name="Elipse 18">
+            <a:extLst>
+              <a:ext uri="{FF2B5EF4-FFF2-40B4-BE49-F238E27FC236}">
+                <a16:creationId xmlns:a16="http://schemas.microsoft.com/office/drawing/2014/main" id="{7DCF330A-A12A-99DC-B662-514A10D73D02}"/>
               </a:ext>
             </a:extLst>
           </p:cNvPr>
@@ -16969,14 +17020,14 @@
         </p:nvSpPr>
         <p:spPr>
           <a:xfrm>
-            <a:off x="10702024" y="-708470"/>
-            <a:ext cx="515461" cy="515461"/>
+            <a:off x="9967944" y="359844"/>
+            <a:ext cx="528669" cy="515461"/>
           </a:xfrm>
           <a:prstGeom prst="ellipse">
             <a:avLst/>
           </a:prstGeom>
           <a:solidFill>
-            <a:srgbClr val="8403E8"/>
+            <a:srgbClr val="7030A0"/>
           </a:solidFill>
           <a:ln>
             <a:noFill/>
@@ -17013,10 +17064,10 @@
       </p:sp>
       <p:sp>
         <p:nvSpPr>
-          <p:cNvPr id="47" name="TextBox 11">
-            <a:extLst>
-              <a:ext uri="{FF2B5EF4-FFF2-40B4-BE49-F238E27FC236}">
-                <a16:creationId xmlns:a16="http://schemas.microsoft.com/office/drawing/2014/main" id="{628F1FEC-C908-CEC4-EA05-E249828D4B5D}"/>
+          <p:cNvPr id="20" name="TextBox 11">
+            <a:extLst>
+              <a:ext uri="{FF2B5EF4-FFF2-40B4-BE49-F238E27FC236}">
+                <a16:creationId xmlns:a16="http://schemas.microsoft.com/office/drawing/2014/main" id="{0CED7EB0-240B-3BE2-F6E5-7F50C23B1168}"/>
               </a:ext>
             </a:extLst>
           </p:cNvPr>
@@ -17025,58 +17076,7 @@
         </p:nvSpPr>
         <p:spPr>
           <a:xfrm>
-            <a:off x="11266310" y="-694863"/>
-            <a:ext cx="1547446" cy="461665"/>
-          </a:xfrm>
-          <a:prstGeom prst="rect">
-            <a:avLst/>
-          </a:prstGeom>
-          <a:noFill/>
-        </p:spPr>
-        <p:txBody>
-          <a:bodyPr rot="0" spcFirstLastPara="0" vertOverflow="overflow" horzOverflow="overflow" vert="horz" wrap="square" lIns="91440" tIns="45720" rIns="91440" bIns="45720" numCol="1" spcCol="0" rtlCol="0" fromWordArt="0" anchor="t" anchorCtr="0" forceAA="0" compatLnSpc="1">
-            <a:prstTxWarp prst="textNoShape">
-              <a:avLst/>
-            </a:prstTxWarp>
-            <a:spAutoFit/>
-          </a:bodyPr>
-          <a:lstStyle/>
-          <a:p>
-            <a:pPr algn="l"/>
-            <a:r>
-              <a:rPr lang="en-US" sz="2400" dirty="0">
-                <a:solidFill>
-                  <a:srgbClr val="8403E8"/>
-                </a:solidFill>
-                <a:latin typeface="Raleway"/>
-                <a:cs typeface="Calibri"/>
-              </a:rPr>
-              <a:t>contexto</a:t>
-            </a:r>
-            <a:endParaRPr lang="en-US" sz="2400" dirty="0">
-              <a:solidFill>
-                <a:srgbClr val="8403E8"/>
-              </a:solidFill>
-              <a:cs typeface="Calibri"/>
-            </a:endParaRPr>
-          </a:p>
-        </p:txBody>
-      </p:sp>
-      <p:sp>
-        <p:nvSpPr>
-          <p:cNvPr id="53" name="TextBox 11">
-            <a:extLst>
-              <a:ext uri="{FF2B5EF4-FFF2-40B4-BE49-F238E27FC236}">
-                <a16:creationId xmlns:a16="http://schemas.microsoft.com/office/drawing/2014/main" id="{A9B2257A-0FFE-2650-E0DF-9DCF4A553FBB}"/>
-              </a:ext>
-            </a:extLst>
-          </p:cNvPr>
-          <p:cNvSpPr txBox="1"/>
-          <p:nvPr/>
-        </p:nvSpPr>
-        <p:spPr>
-          <a:xfrm>
-            <a:off x="10345296" y="386018"/>
+            <a:off x="9967944" y="-646189"/>
             <a:ext cx="1587097" cy="461665"/>
           </a:xfrm>
           <a:prstGeom prst="rect">
@@ -17115,10 +17115,10 @@
       </p:sp>
       <p:sp>
         <p:nvSpPr>
-          <p:cNvPr id="54" name="Elipse 53">
-            <a:extLst>
-              <a:ext uri="{FF2B5EF4-FFF2-40B4-BE49-F238E27FC236}">
-                <a16:creationId xmlns:a16="http://schemas.microsoft.com/office/drawing/2014/main" id="{8584F5AD-17C1-B7A1-8DAB-ED8BC8068F0F}"/>
+          <p:cNvPr id="21" name="Elipse 20">
+            <a:extLst>
+              <a:ext uri="{FF2B5EF4-FFF2-40B4-BE49-F238E27FC236}">
+                <a16:creationId xmlns:a16="http://schemas.microsoft.com/office/drawing/2014/main" id="{84DD8561-494C-05D2-AC70-7057B9F47539}"/>
               </a:ext>
             </a:extLst>
           </p:cNvPr>
@@ -17127,7 +17127,7 @@
         </p:nvSpPr>
         <p:spPr>
           <a:xfrm>
-            <a:off x="9816627" y="359119"/>
+            <a:off x="9439275" y="-673088"/>
             <a:ext cx="528669" cy="515461"/>
           </a:xfrm>
           <a:prstGeom prst="ellipse">
@@ -17760,7 +17760,7 @@
         </p:nvSpPr>
         <p:spPr>
           <a:xfrm>
-            <a:off x="824942" y="2718488"/>
+            <a:off x="5795259" y="1651042"/>
             <a:ext cx="3666190" cy="1077218"/>
           </a:xfrm>
           <a:prstGeom prst="rect">
@@ -17907,7 +17907,7 @@
         </p:nvSpPr>
         <p:spPr>
           <a:xfrm>
-            <a:off x="2961447" y="4872699"/>
+            <a:off x="1709925" y="2345543"/>
             <a:ext cx="2822593" cy="1077218"/>
           </a:xfrm>
           <a:prstGeom prst="rect">
@@ -18054,7 +18054,7 @@
         </p:nvSpPr>
         <p:spPr>
           <a:xfrm>
-            <a:off x="6166403" y="1636965"/>
+            <a:off x="7769409" y="3755084"/>
             <a:ext cx="3671632" cy="1077218"/>
           </a:xfrm>
           <a:prstGeom prst="rect">
@@ -18201,7 +18201,7 @@
         </p:nvSpPr>
         <p:spPr>
           <a:xfrm>
-            <a:off x="7997056" y="3795706"/>
+            <a:off x="2961447" y="4955790"/>
             <a:ext cx="3057452" cy="1077218"/>
           </a:xfrm>
           <a:prstGeom prst="rect">
@@ -18350,7 +18350,7 @@
         </p:nvCxnSpPr>
         <p:spPr>
           <a:xfrm flipH="1">
-            <a:off x="4479649" y="2407249"/>
+            <a:off x="4479649" y="2411590"/>
             <a:ext cx="1686754" cy="521754"/>
           </a:xfrm>
           <a:prstGeom prst="straightConnector1">
@@ -18589,14 +18589,14 @@
   <p:clrMapOvr>
     <a:masterClrMapping/>
   </p:clrMapOvr>
-  <mc:AlternateContent xmlns:mc="http://schemas.openxmlformats.org/markup-compatibility/2006" xmlns:p159="http://schemas.microsoft.com/office/powerpoint/2015/09/main">
-    <mc:Choice Requires="p159">
-      <p:transition xmlns:p14="http://schemas.microsoft.com/office/powerpoint/2010/main" spd="slow" p14:dur="2000">
+  <mc:AlternateContent xmlns:mc="http://schemas.openxmlformats.org/markup-compatibility/2006">
+    <mc:Choice xmlns:p159="http://schemas.microsoft.com/office/powerpoint/2015/09/main" Requires="p159">
+      <p:transition>
         <p159:morph option="byObject"/>
       </p:transition>
     </mc:Choice>
-    <mc:Fallback xmlns="">
-      <p:transition spd="slow">
+    <mc:Fallback>
+      <p:transition>
         <p:fade/>
       </p:transition>
     </mc:Fallback>
@@ -18621,7 +18621,7 @@
                         <p:par>
                           <p:cTn id="4" fill="hold">
                             <p:stCondLst>
-                              <p:cond delay="0"/>
+                              <p:cond delay="1000"/>
                             </p:stCondLst>
                             <p:childTnLst>
                               <p:par>
@@ -18638,7 +18638,7 @@
                                           </p:stCondLst>
                                         </p:cTn>
                                         <p:tgtEl>
-                                          <p:spTgt spid="14"/>
+                                          <p:spTgt spid="6"/>
                                         </p:tgtEl>
                                         <p:attrNameLst>
                                           <p:attrName>style.visibility</p:attrName>
@@ -18650,9 +18650,9 @@
                                     </p:set>
                                     <p:animEffect transition="in" filter="fade">
                                       <p:cBhvr>
-                                        <p:cTn id="7" dur="1000"/>
+                                        <p:cTn id="7" dur="500"/>
                                         <p:tgtEl>
-                                          <p:spTgt spid="14"/>
+                                          <p:spTgt spid="6"/>
                                         </p:tgtEl>
                                       </p:cBhvr>
                                     </p:animEffect>
@@ -18665,7 +18665,7 @@
                         <p:par>
                           <p:cTn id="8" fill="hold">
                             <p:stCondLst>
-                              <p:cond delay="1000"/>
+                              <p:cond delay="1500"/>
                             </p:stCondLst>
                             <p:childTnLst>
                               <p:par>
@@ -18709,7 +18709,7 @@
                         <p:par>
                           <p:cTn id="12" fill="hold">
                             <p:stCondLst>
-                              <p:cond delay="1500"/>
+                              <p:cond delay="2000"/>
                             </p:stCondLst>
                             <p:childTnLst>
                               <p:par>
@@ -18726,7 +18726,7 @@
                                           </p:stCondLst>
                                         </p:cTn>
                                         <p:tgtEl>
-                                          <p:spTgt spid="6"/>
+                                          <p:spTgt spid="7"/>
                                         </p:tgtEl>
                                         <p:attrNameLst>
                                           <p:attrName>style.visibility</p:attrName>
@@ -18740,7 +18740,7 @@
                                       <p:cBhvr>
                                         <p:cTn id="15" dur="500"/>
                                         <p:tgtEl>
-                                          <p:spTgt spid="6"/>
+                                          <p:spTgt spid="7"/>
                                         </p:tgtEl>
                                       </p:cBhvr>
                                     </p:animEffect>
@@ -18753,7 +18753,7 @@
                         <p:par>
                           <p:cTn id="16" fill="hold">
                             <p:stCondLst>
-                              <p:cond delay="2000"/>
+                              <p:cond delay="2500"/>
                             </p:stCondLst>
                             <p:childTnLst>
                               <p:par>
@@ -18797,7 +18797,7 @@
                         <p:par>
                           <p:cTn id="20" fill="hold">
                             <p:stCondLst>
-                              <p:cond delay="2500"/>
+                              <p:cond delay="3000"/>
                             </p:stCondLst>
                             <p:childTnLst>
                               <p:par>
@@ -18814,7 +18814,7 @@
                                           </p:stCondLst>
                                         </p:cTn>
                                         <p:tgtEl>
-                                          <p:spTgt spid="16"/>
+                                          <p:spTgt spid="14"/>
                                         </p:tgtEl>
                                         <p:attrNameLst>
                                           <p:attrName>style.visibility</p:attrName>
@@ -18828,7 +18828,7 @@
                                       <p:cBhvr>
                                         <p:cTn id="23" dur="500"/>
                                         <p:tgtEl>
-                                          <p:spTgt spid="16"/>
+                                          <p:spTgt spid="14"/>
                                         </p:tgtEl>
                                       </p:cBhvr>
                                     </p:animEffect>
@@ -18841,7 +18841,7 @@
                         <p:par>
                           <p:cTn id="24" fill="hold">
                             <p:stCondLst>
-                              <p:cond delay="3000"/>
+                              <p:cond delay="3500"/>
                             </p:stCondLst>
                             <p:childTnLst>
                               <p:par>
@@ -18885,7 +18885,7 @@
                         <p:par>
                           <p:cTn id="28" fill="hold">
                             <p:stCondLst>
-                              <p:cond delay="3500"/>
+                              <p:cond delay="4000"/>
                             </p:stCondLst>
                             <p:childTnLst>
                               <p:par>
@@ -18902,7 +18902,7 @@
                                           </p:stCondLst>
                                         </p:cTn>
                                         <p:tgtEl>
-                                          <p:spTgt spid="7"/>
+                                          <p:spTgt spid="16"/>
                                         </p:tgtEl>
                                         <p:attrNameLst>
                                           <p:attrName>style.visibility</p:attrName>
@@ -18914,9 +18914,9 @@
                                     </p:set>
                                     <p:animEffect transition="in" filter="fade">
                                       <p:cBhvr>
-                                        <p:cTn id="31" dur="1000"/>
+                                        <p:cTn id="31" dur="500"/>
                                         <p:tgtEl>
-                                          <p:spTgt spid="7"/>
+                                          <p:spTgt spid="16"/>
                                         </p:tgtEl>
                                       </p:cBhvr>
                                     </p:animEffect>
@@ -22473,6 +22473,12 @@
 </file>
 
 <file path=customXml/item1.xml><?xml version="1.0" encoding="utf-8"?>
+<p:properties xmlns:p="http://schemas.microsoft.com/office/2006/metadata/properties" xmlns:xsi="http://www.w3.org/2001/XMLSchema-instance" xmlns:pc="http://schemas.microsoft.com/office/infopath/2007/PartnerControls">
+  <documentManagement/>
+</p:properties>
+</file>
+
+<file path=customXml/item2.xml><?xml version="1.0" encoding="utf-8"?>
 <ct:contentTypeSchema xmlns:ct="http://schemas.microsoft.com/office/2006/metadata/contentType" xmlns:ma="http://schemas.microsoft.com/office/2006/metadata/properties/metaAttributes" ct:_="" ma:_="" ma:contentTypeName="Document" ma:contentTypeID="0x010100CD94351161D70F4CAEBD7B86231B3DDF" ma:contentTypeVersion="4" ma:contentTypeDescription="Create a new document." ma:contentTypeScope="" ma:versionID="5cc1431f9783d4f5e516e1e6dd293d6e">
   <xsd:schema xmlns:xsd="http://www.w3.org/2001/XMLSchema" xmlns:xs="http://www.w3.org/2001/XMLSchema" xmlns:p="http://schemas.microsoft.com/office/2006/metadata/properties" xmlns:ns3="4bc5c97c-1d73-4ddd-b761-3e2b250dfd29" targetNamespace="http://schemas.microsoft.com/office/2006/metadata/properties" ma:root="true" ma:fieldsID="81d426787a2ad5e2b6fa71d4453f615a" ns3:_="">
     <xsd:import namespace="4bc5c97c-1d73-4ddd-b761-3e2b250dfd29"/>
@@ -22618,12 +22624,6 @@
 </ct:contentTypeSchema>
 </file>
 
-<file path=customXml/item2.xml><?xml version="1.0" encoding="utf-8"?>
-<p:properties xmlns:p="http://schemas.microsoft.com/office/2006/metadata/properties" xmlns:xsi="http://www.w3.org/2001/XMLSchema-instance" xmlns:pc="http://schemas.microsoft.com/office/infopath/2007/PartnerControls">
-  <documentManagement/>
-</p:properties>
-</file>
-
 <file path=customXml/item3.xml><?xml version="1.0" encoding="utf-8"?>
 <?mso-contentType ?>
 <FormTemplates xmlns="http://schemas.microsoft.com/sharepoint/v3/contenttype/forms">
@@ -22634,6 +22634,22 @@
 </file>
 
 <file path=customXml/itemProps1.xml><?xml version="1.0" encoding="utf-8"?>
+<ds:datastoreItem xmlns:ds="http://schemas.openxmlformats.org/officeDocument/2006/customXml" ds:itemID="{D0CF3473-0CF4-4370-879D-E6441508A2E5}">
+  <ds:schemaRefs>
+    <ds:schemaRef ds:uri="4bc5c97c-1d73-4ddd-b761-3e2b250dfd29"/>
+    <ds:schemaRef ds:uri="http://purl.org/dc/dcmitype/"/>
+    <ds:schemaRef ds:uri="http://schemas.microsoft.com/office/2006/documentManagement/types"/>
+    <ds:schemaRef ds:uri="http://schemas.openxmlformats.org/package/2006/metadata/core-properties"/>
+    <ds:schemaRef ds:uri="http://www.w3.org/XML/1998/namespace"/>
+    <ds:schemaRef ds:uri="http://purl.org/dc/elements/1.1/"/>
+    <ds:schemaRef ds:uri="http://schemas.microsoft.com/office/infopath/2007/PartnerControls"/>
+    <ds:schemaRef ds:uri="http://schemas.microsoft.com/office/2006/metadata/properties"/>
+    <ds:schemaRef ds:uri="http://purl.org/dc/terms/"/>
+  </ds:schemaRefs>
+</ds:datastoreItem>
+</file>
+
+<file path=customXml/itemProps2.xml><?xml version="1.0" encoding="utf-8"?>
 <ds:datastoreItem xmlns:ds="http://schemas.openxmlformats.org/officeDocument/2006/customXml" ds:itemID="{465069EE-6FD9-406D-8F8E-0381277CBFD4}">
   <ds:schemaRefs>
     <ds:schemaRef ds:uri="http://schemas.microsoft.com/office/2006/metadata/contentType"/>
@@ -22651,22 +22667,6 @@
 </ds:datastoreItem>
 </file>
 
-<file path=customXml/itemProps2.xml><?xml version="1.0" encoding="utf-8"?>
-<ds:datastoreItem xmlns:ds="http://schemas.openxmlformats.org/officeDocument/2006/customXml" ds:itemID="{D0CF3473-0CF4-4370-879D-E6441508A2E5}">
-  <ds:schemaRefs>
-    <ds:schemaRef ds:uri="4bc5c97c-1d73-4ddd-b761-3e2b250dfd29"/>
-    <ds:schemaRef ds:uri="http://purl.org/dc/dcmitype/"/>
-    <ds:schemaRef ds:uri="http://schemas.microsoft.com/office/2006/documentManagement/types"/>
-    <ds:schemaRef ds:uri="http://schemas.openxmlformats.org/package/2006/metadata/core-properties"/>
-    <ds:schemaRef ds:uri="http://www.w3.org/XML/1998/namespace"/>
-    <ds:schemaRef ds:uri="http://purl.org/dc/elements/1.1/"/>
-    <ds:schemaRef ds:uri="http://schemas.microsoft.com/office/infopath/2007/PartnerControls"/>
-    <ds:schemaRef ds:uri="http://schemas.microsoft.com/office/2006/metadata/properties"/>
-    <ds:schemaRef ds:uri="http://purl.org/dc/terms/"/>
-  </ds:schemaRefs>
-</ds:datastoreItem>
-</file>
-
 <file path=customXml/itemProps3.xml><?xml version="1.0" encoding="utf-8"?>
 <ds:datastoreItem xmlns:ds="http://schemas.openxmlformats.org/officeDocument/2006/customXml" ds:itemID="{94D73380-892F-4A54-AC50-91BE1A20A922}">
   <ds:schemaRefs>

</xml_diff>